<commit_message>
(2020-06-04) 기능정의서, 화면설계서,  index.html 수정.
</commit_message>
<xml_diff>
--- a/Documents/화면설계서.pptx
+++ b/Documents/화면설계서.pptx
@@ -7,6 +7,9 @@
   <p:notesMasterIdLst>
     <p:notesMasterId r:id="rId22"/>
   </p:notesMasterIdLst>
+  <p:handoutMasterIdLst>
+    <p:handoutMasterId r:id="rId23"/>
+  </p:handoutMasterIdLst>
   <p:sldIdLst>
     <p:sldId id="279" r:id="rId2"/>
     <p:sldId id="274" r:id="rId3"/>
@@ -134,6 +137,195 @@
 </p:presentation>
 </file>
 
+<file path=ppt/handoutMasters/handoutMaster1.xml><?xml version="1.0" encoding="utf-8"?>
+<p:handoutMaster xmlns:a="http://schemas.openxmlformats.org/drawingml/2006/main" xmlns:r="http://schemas.openxmlformats.org/officeDocument/2006/relationships" xmlns:p="http://schemas.openxmlformats.org/presentationml/2006/main">
+  <p:cSld>
+    <p:bg>
+      <p:bgRef idx="1001">
+        <a:schemeClr val="bg1"/>
+      </p:bgRef>
+    </p:bg>
+    <p:spTree>
+      <p:nvGrpSpPr>
+        <p:cNvPr id="1" name=""/>
+        <p:cNvGrpSpPr/>
+        <p:nvPr/>
+      </p:nvGrpSpPr>
+      <p:grpSpPr>
+        <a:xfrm>
+          <a:off x="0" y="0"/>
+          <a:ext cx="0" cy="0"/>
+          <a:chOff x="0" y="0"/>
+          <a:chExt cx="0" cy="0"/>
+        </a:xfrm>
+      </p:grpSpPr>
+      <p:sp>
+        <p:nvSpPr>
+          <p:cNvPr id="2" name="머리글 개체 틀 1">
+            <a:extLst>
+              <a:ext uri="{FF2B5EF4-FFF2-40B4-BE49-F238E27FC236}">
+                <a16:creationId xmlns:a16="http://schemas.microsoft.com/office/drawing/2014/main" id="{3594E843-734E-469C-842B-FB89E5959DB8}"/>
+              </a:ext>
+            </a:extLst>
+          </p:cNvPr>
+          <p:cNvSpPr>
+            <a:spLocks noGrp="1"/>
+          </p:cNvSpPr>
+          <p:nvPr>
+            <p:ph type="hdr" sz="quarter"/>
+          </p:nvPr>
+        </p:nvSpPr>
+        <p:spPr>
+          <a:xfrm>
+            <a:off x="0" y="0"/>
+            <a:ext cx="2971800" cy="458788"/>
+          </a:xfrm>
+          <a:prstGeom prst="rect">
+            <a:avLst/>
+          </a:prstGeom>
+        </p:spPr>
+        <p:txBody>
+          <a:bodyPr vert="horz" lIns="91440" tIns="45720" rIns="91440" bIns="45720" rtlCol="0"/>
+          <a:lstStyle>
+            <a:lvl1pPr algn="l">
+              <a:defRPr sz="1200"/>
+            </a:lvl1pPr>
+          </a:lstStyle>
+          <a:p>
+            <a:endParaRPr lang="ko-KR" altLang="en-US"/>
+          </a:p>
+        </p:txBody>
+      </p:sp>
+      <p:sp>
+        <p:nvSpPr>
+          <p:cNvPr id="3" name="날짜 개체 틀 2">
+            <a:extLst>
+              <a:ext uri="{FF2B5EF4-FFF2-40B4-BE49-F238E27FC236}">
+                <a16:creationId xmlns:a16="http://schemas.microsoft.com/office/drawing/2014/main" id="{16A79E38-2C00-4328-94C6-808D7FCD6060}"/>
+              </a:ext>
+            </a:extLst>
+          </p:cNvPr>
+          <p:cNvSpPr>
+            <a:spLocks noGrp="1"/>
+          </p:cNvSpPr>
+          <p:nvPr>
+            <p:ph type="dt" sz="quarter" idx="1"/>
+          </p:nvPr>
+        </p:nvSpPr>
+        <p:spPr>
+          <a:xfrm>
+            <a:off x="3884613" y="0"/>
+            <a:ext cx="2971800" cy="458788"/>
+          </a:xfrm>
+          <a:prstGeom prst="rect">
+            <a:avLst/>
+          </a:prstGeom>
+        </p:spPr>
+        <p:txBody>
+          <a:bodyPr vert="horz" lIns="91440" tIns="45720" rIns="91440" bIns="45720" rtlCol="0"/>
+          <a:lstStyle>
+            <a:lvl1pPr algn="r">
+              <a:defRPr sz="1200"/>
+            </a:lvl1pPr>
+          </a:lstStyle>
+          <a:p>
+            <a:fld id="{43423BA1-D08D-4CFF-8BED-DE6561336F37}" type="datetimeFigureOut">
+              <a:rPr lang="ko-KR" altLang="en-US" smtClean="0"/>
+              <a:t>2020-06-04</a:t>
+            </a:fld>
+            <a:endParaRPr lang="ko-KR" altLang="en-US"/>
+          </a:p>
+        </p:txBody>
+      </p:sp>
+      <p:sp>
+        <p:nvSpPr>
+          <p:cNvPr id="4" name="바닥글 개체 틀 3">
+            <a:extLst>
+              <a:ext uri="{FF2B5EF4-FFF2-40B4-BE49-F238E27FC236}">
+                <a16:creationId xmlns:a16="http://schemas.microsoft.com/office/drawing/2014/main" id="{4E4C033F-C87B-4496-BD1A-686CAED450B5}"/>
+              </a:ext>
+            </a:extLst>
+          </p:cNvPr>
+          <p:cNvSpPr>
+            <a:spLocks noGrp="1"/>
+          </p:cNvSpPr>
+          <p:nvPr>
+            <p:ph type="ftr" sz="quarter" idx="2"/>
+          </p:nvPr>
+        </p:nvSpPr>
+        <p:spPr>
+          <a:xfrm>
+            <a:off x="0" y="8685213"/>
+            <a:ext cx="2971800" cy="458787"/>
+          </a:xfrm>
+          <a:prstGeom prst="rect">
+            <a:avLst/>
+          </a:prstGeom>
+        </p:spPr>
+        <p:txBody>
+          <a:bodyPr vert="horz" lIns="91440" tIns="45720" rIns="91440" bIns="45720" rtlCol="0" anchor="b"/>
+          <a:lstStyle>
+            <a:lvl1pPr algn="l">
+              <a:defRPr sz="1200"/>
+            </a:lvl1pPr>
+          </a:lstStyle>
+          <a:p>
+            <a:endParaRPr lang="ko-KR" altLang="en-US"/>
+          </a:p>
+        </p:txBody>
+      </p:sp>
+      <p:sp>
+        <p:nvSpPr>
+          <p:cNvPr id="5" name="슬라이드 번호 개체 틀 4">
+            <a:extLst>
+              <a:ext uri="{FF2B5EF4-FFF2-40B4-BE49-F238E27FC236}">
+                <a16:creationId xmlns:a16="http://schemas.microsoft.com/office/drawing/2014/main" id="{DDC6C8AA-442A-460C-BE21-90BE2D982DE1}"/>
+              </a:ext>
+            </a:extLst>
+          </p:cNvPr>
+          <p:cNvSpPr>
+            <a:spLocks noGrp="1"/>
+          </p:cNvSpPr>
+          <p:nvPr>
+            <p:ph type="sldNum" sz="quarter" idx="3"/>
+          </p:nvPr>
+        </p:nvSpPr>
+        <p:spPr>
+          <a:xfrm>
+            <a:off x="3884613" y="8685213"/>
+            <a:ext cx="2971800" cy="458787"/>
+          </a:xfrm>
+          <a:prstGeom prst="rect">
+            <a:avLst/>
+          </a:prstGeom>
+        </p:spPr>
+        <p:txBody>
+          <a:bodyPr vert="horz" lIns="91440" tIns="45720" rIns="91440" bIns="45720" rtlCol="0" anchor="b"/>
+          <a:lstStyle>
+            <a:lvl1pPr algn="r">
+              <a:defRPr sz="1200"/>
+            </a:lvl1pPr>
+          </a:lstStyle>
+          <a:p>
+            <a:fld id="{A9754DE0-3F99-4432-AB46-3393E6FB90A6}" type="slidenum">
+              <a:rPr lang="ko-KR" altLang="en-US" smtClean="0"/>
+              <a:t>‹#›</a:t>
+            </a:fld>
+            <a:endParaRPr lang="ko-KR" altLang="en-US"/>
+          </a:p>
+        </p:txBody>
+      </p:sp>
+    </p:spTree>
+    <p:extLst>
+      <p:ext uri="{BB962C8B-B14F-4D97-AF65-F5344CB8AC3E}">
+        <p14:creationId xmlns:p14="http://schemas.microsoft.com/office/powerpoint/2010/main" val="3799135"/>
+      </p:ext>
+    </p:extLst>
+  </p:cSld>
+  <p:clrMap bg1="lt1" tx1="dk1" bg2="lt2" tx2="dk2" accent1="accent1" accent2="accent2" accent3="accent3" accent4="accent4" accent5="accent5" accent6="accent6" hlink="hlink" folHlink="folHlink"/>
+</p:handoutMaster>
+</file>
+
 <file path=ppt/notesMasters/notesMaster1.xml><?xml version="1.0" encoding="utf-8"?>
 <p:notesMaster xmlns:a="http://schemas.openxmlformats.org/drawingml/2006/main" xmlns:r="http://schemas.openxmlformats.org/officeDocument/2006/relationships" xmlns:p="http://schemas.openxmlformats.org/presentationml/2006/main">
   <p:cSld>
@@ -216,7 +408,7 @@
           <a:p>
             <a:fld id="{2A2A61BD-85B6-4952-8352-7323239EDB97}" type="datetimeFigureOut">
               <a:rPr lang="ko-KR" altLang="en-US" smtClean="0"/>
-              <a:t>2020-06-03</a:t>
+              <a:t>2020-06-04</a:t>
             </a:fld>
             <a:endParaRPr lang="ko-KR" altLang="en-US"/>
           </a:p>
@@ -612,7 +804,7 @@
           <a:p>
             <a:fld id="{1F3F10A2-1868-4C8C-9F00-753B47F5FC10}" type="datetimeFigureOut">
               <a:rPr lang="ko-KR" altLang="en-US" smtClean="0"/>
-              <a:t>2020-06-03</a:t>
+              <a:t>2020-06-04</a:t>
             </a:fld>
             <a:endParaRPr lang="ko-KR" altLang="en-US"/>
           </a:p>
@@ -780,7 +972,7 @@
           <a:p>
             <a:fld id="{1F3F10A2-1868-4C8C-9F00-753B47F5FC10}" type="datetimeFigureOut">
               <a:rPr lang="ko-KR" altLang="en-US" smtClean="0"/>
-              <a:t>2020-06-03</a:t>
+              <a:t>2020-06-04</a:t>
             </a:fld>
             <a:endParaRPr lang="ko-KR" altLang="en-US"/>
           </a:p>
@@ -958,7 +1150,7 @@
           <a:p>
             <a:fld id="{1F3F10A2-1868-4C8C-9F00-753B47F5FC10}" type="datetimeFigureOut">
               <a:rPr lang="ko-KR" altLang="en-US" smtClean="0"/>
-              <a:t>2020-06-03</a:t>
+              <a:t>2020-06-04</a:t>
             </a:fld>
             <a:endParaRPr lang="ko-KR" altLang="en-US"/>
           </a:p>
@@ -1126,7 +1318,7 @@
           <a:p>
             <a:fld id="{1F3F10A2-1868-4C8C-9F00-753B47F5FC10}" type="datetimeFigureOut">
               <a:rPr lang="ko-KR" altLang="en-US" smtClean="0"/>
-              <a:t>2020-06-03</a:t>
+              <a:t>2020-06-04</a:t>
             </a:fld>
             <a:endParaRPr lang="ko-KR" altLang="en-US"/>
           </a:p>
@@ -1371,7 +1563,7 @@
           <a:p>
             <a:fld id="{1F3F10A2-1868-4C8C-9F00-753B47F5FC10}" type="datetimeFigureOut">
               <a:rPr lang="ko-KR" altLang="en-US" smtClean="0"/>
-              <a:t>2020-06-03</a:t>
+              <a:t>2020-06-04</a:t>
             </a:fld>
             <a:endParaRPr lang="ko-KR" altLang="en-US"/>
           </a:p>
@@ -1600,7 +1792,7 @@
           <a:p>
             <a:fld id="{1F3F10A2-1868-4C8C-9F00-753B47F5FC10}" type="datetimeFigureOut">
               <a:rPr lang="ko-KR" altLang="en-US" smtClean="0"/>
-              <a:t>2020-06-03</a:t>
+              <a:t>2020-06-04</a:t>
             </a:fld>
             <a:endParaRPr lang="ko-KR" altLang="en-US"/>
           </a:p>
@@ -1964,7 +2156,7 @@
           <a:p>
             <a:fld id="{1F3F10A2-1868-4C8C-9F00-753B47F5FC10}" type="datetimeFigureOut">
               <a:rPr lang="ko-KR" altLang="en-US" smtClean="0"/>
-              <a:t>2020-06-03</a:t>
+              <a:t>2020-06-04</a:t>
             </a:fld>
             <a:endParaRPr lang="ko-KR" altLang="en-US"/>
           </a:p>
@@ -2081,7 +2273,7 @@
           <a:p>
             <a:fld id="{1F3F10A2-1868-4C8C-9F00-753B47F5FC10}" type="datetimeFigureOut">
               <a:rPr lang="ko-KR" altLang="en-US" smtClean="0"/>
-              <a:t>2020-06-03</a:t>
+              <a:t>2020-06-04</a:t>
             </a:fld>
             <a:endParaRPr lang="ko-KR" altLang="en-US"/>
           </a:p>
@@ -2176,7 +2368,7 @@
           <a:p>
             <a:fld id="{1F3F10A2-1868-4C8C-9F00-753B47F5FC10}" type="datetimeFigureOut">
               <a:rPr lang="ko-KR" altLang="en-US" smtClean="0"/>
-              <a:t>2020-06-03</a:t>
+              <a:t>2020-06-04</a:t>
             </a:fld>
             <a:endParaRPr lang="ko-KR" altLang="en-US"/>
           </a:p>
@@ -2451,7 +2643,7 @@
           <a:p>
             <a:fld id="{1F3F10A2-1868-4C8C-9F00-753B47F5FC10}" type="datetimeFigureOut">
               <a:rPr lang="ko-KR" altLang="en-US" smtClean="0"/>
-              <a:t>2020-06-03</a:t>
+              <a:t>2020-06-04</a:t>
             </a:fld>
             <a:endParaRPr lang="ko-KR" altLang="en-US"/>
           </a:p>
@@ -2703,7 +2895,7 @@
           <a:p>
             <a:fld id="{1F3F10A2-1868-4C8C-9F00-753B47F5FC10}" type="datetimeFigureOut">
               <a:rPr lang="ko-KR" altLang="en-US" smtClean="0"/>
-              <a:t>2020-06-03</a:t>
+              <a:t>2020-06-04</a:t>
             </a:fld>
             <a:endParaRPr lang="ko-KR" altLang="en-US"/>
           </a:p>
@@ -2914,7 +3106,7 @@
           <a:p>
             <a:fld id="{1F3F10A2-1868-4C8C-9F00-753B47F5FC10}" type="datetimeFigureOut">
               <a:rPr lang="ko-KR" altLang="en-US" smtClean="0"/>
-              <a:t>2020-06-03</a:t>
+              <a:t>2020-06-04</a:t>
             </a:fld>
             <a:endParaRPr lang="ko-KR" altLang="en-US"/>
           </a:p>
@@ -4062,7 +4254,7 @@
           <p:nvPr>
             <p:extLst>
               <p:ext uri="{D42A27DB-BD31-4B8C-83A1-F6EECF244321}">
-                <p14:modId xmlns:p14="http://schemas.microsoft.com/office/powerpoint/2010/main" val="1862997878"/>
+                <p14:modId xmlns:p14="http://schemas.microsoft.com/office/powerpoint/2010/main" val="2844410726"/>
               </p:ext>
             </p:extLst>
           </p:nvPr>
@@ -4380,7 +4572,15 @@
                             <a:schemeClr val="tx1"/>
                           </a:solidFill>
                         </a:rPr>
-                        <a:t>F-15</a:t>
+                        <a:t>PS-front-</a:t>
+                      </a:r>
+                      <a:r>
+                        <a:rPr lang="en-US" altLang="ko-KR" sz="1600" dirty="0" err="1">
+                          <a:solidFill>
+                            <a:schemeClr val="tx1"/>
+                          </a:solidFill>
+                        </a:rPr>
+                        <a:t>pwd_find</a:t>
                       </a:r>
                       <a:endParaRPr lang="ko-KR" altLang="en-US" sz="1600" dirty="0">
                         <a:solidFill>
@@ -4496,22 +4696,6 @@
                     <a:lstStyle/>
                     <a:p>
                       <a:pPr algn="ctr" latinLnBrk="1"/>
-                      <a:r>
-                        <a:rPr lang="en-US" altLang="ko-KR" sz="1600" dirty="0" err="1">
-                          <a:solidFill>
-                            <a:schemeClr val="tx1"/>
-                          </a:solidFill>
-                        </a:rPr>
-                        <a:t>Gnb</a:t>
-                      </a:r>
-                      <a:r>
-                        <a:rPr lang="en-US" altLang="ko-KR" sz="1600" dirty="0">
-                          <a:solidFill>
-                            <a:schemeClr val="tx1"/>
-                          </a:solidFill>
-                        </a:rPr>
-                        <a:t> &gt; </a:t>
-                      </a:r>
                       <a:r>
                         <a:rPr lang="ko-KR" altLang="en-US" sz="1600" dirty="0">
                           <a:solidFill>
@@ -4653,7 +4837,7 @@
           <p:nvPr>
             <p:extLst>
               <p:ext uri="{D42A27DB-BD31-4B8C-83A1-F6EECF244321}">
-                <p14:modId xmlns:p14="http://schemas.microsoft.com/office/powerpoint/2010/main" val="2758597640"/>
+                <p14:modId xmlns:p14="http://schemas.microsoft.com/office/powerpoint/2010/main" val="2377372988"/>
               </p:ext>
             </p:extLst>
           </p:nvPr>
@@ -5740,7 +5924,7 @@
                             <a:schemeClr val="tx1"/>
                           </a:solidFill>
                         </a:rPr>
-                        <a:t> - 6</a:t>
+                        <a:t> - </a:t>
                       </a:r>
                       <a:r>
                         <a:rPr lang="ko-KR" altLang="en-US" sz="1100" baseline="0" dirty="0">
@@ -5748,7 +5932,7 @@
                             <a:schemeClr val="tx1"/>
                           </a:solidFill>
                         </a:rPr>
-                        <a:t>자리 인증번호 출력</a:t>
+                        <a:t>인증 요청 기능 버튼</a:t>
                       </a:r>
                       <a:r>
                         <a:rPr lang="en-US" altLang="ko-KR" sz="1100" baseline="0" dirty="0">
@@ -5977,7 +6161,7 @@
                             <a:schemeClr val="tx1"/>
                           </a:solidFill>
                         </a:rPr>
-                        <a:t>인증 성공 시 팝업창으로 임시 비밀번호 출력</a:t>
+                        <a:t>아이디 요청 기능 버튼</a:t>
                       </a:r>
                       <a:r>
                         <a:rPr lang="en-US" altLang="ko-KR" sz="1100" baseline="0" dirty="0">
@@ -6974,14 +7158,14 @@
           <p:nvPr>
             <p:extLst>
               <p:ext uri="{D42A27DB-BD31-4B8C-83A1-F6EECF244321}">
-                <p14:modId xmlns:p14="http://schemas.microsoft.com/office/powerpoint/2010/main" val="848126803"/>
+                <p14:modId xmlns:p14="http://schemas.microsoft.com/office/powerpoint/2010/main" val="1733988290"/>
               </p:ext>
             </p:extLst>
           </p:nvPr>
         </p:nvGraphicFramePr>
         <p:xfrm>
           <a:off x="0" y="0"/>
-          <a:ext cx="12192000" cy="949960"/>
+          <a:ext cx="12192000" cy="741680"/>
         </p:xfrm>
         <a:graphic>
           <a:graphicData uri="http://schemas.openxmlformats.org/drawingml/2006/table">
@@ -7287,7 +7471,7 @@
                     <a:p>
                       <a:pPr algn="ctr" latinLnBrk="1">
                         <a:lnSpc>
-                          <a:spcPct val="175000"/>
+                          <a:spcPct val="100000"/>
                         </a:lnSpc>
                       </a:pPr>
                       <a:r>
@@ -7296,7 +7480,7 @@
                             <a:schemeClr val="tx1"/>
                           </a:solidFill>
                         </a:rPr>
-                        <a:t>F-16</a:t>
+                        <a:t>PS-front-join</a:t>
                       </a:r>
                       <a:endParaRPr lang="ko-KR" altLang="en-US" sz="1600" dirty="0">
                         <a:solidFill>
@@ -7352,7 +7536,7 @@
                     <a:p>
                       <a:pPr algn="ctr" latinLnBrk="1">
                         <a:lnSpc>
-                          <a:spcPct val="175000"/>
+                          <a:spcPct val="100000"/>
                         </a:lnSpc>
                       </a:pPr>
                       <a:r>
@@ -7415,23 +7599,11 @@
                     <a:bodyPr/>
                     <a:lstStyle/>
                     <a:p>
-                      <a:pPr algn="ctr" latinLnBrk="1"/>
-                      <a:r>
-                        <a:rPr lang="en-US" altLang="ko-KR" sz="1600" dirty="0" err="1">
-                          <a:solidFill>
-                            <a:schemeClr val="tx1"/>
-                          </a:solidFill>
-                        </a:rPr>
-                        <a:t>Gnb</a:t>
-                      </a:r>
-                      <a:r>
-                        <a:rPr lang="en-US" altLang="ko-KR" sz="1600" dirty="0">
-                          <a:solidFill>
-                            <a:schemeClr val="tx1"/>
-                          </a:solidFill>
-                        </a:rPr>
-                        <a:t> &gt; </a:t>
-                      </a:r>
+                      <a:pPr algn="ctr" latinLnBrk="1">
+                        <a:lnSpc>
+                          <a:spcPct val="100000"/>
+                        </a:lnSpc>
+                      </a:pPr>
                       <a:r>
                         <a:rPr lang="ko-KR" altLang="en-US" sz="1600" dirty="0">
                           <a:solidFill>
@@ -7461,65 +7633,6 @@
                           <a:schemeClr val="tx1"/>
                         </a:solidFill>
                       </a:endParaRPr>
-                    </a:p>
-                    <a:p>
-                      <a:pPr algn="ctr" latinLnBrk="1"/>
-                      <a:r>
-                        <a:rPr lang="en-US" altLang="ko-KR" sz="1600" dirty="0" err="1">
-                          <a:solidFill>
-                            <a:schemeClr val="tx1"/>
-                          </a:solidFill>
-                        </a:rPr>
-                        <a:t>Gnb</a:t>
-                      </a:r>
-                      <a:r>
-                        <a:rPr lang="en-US" altLang="ko-KR" sz="1600" dirty="0">
-                          <a:solidFill>
-                            <a:schemeClr val="tx1"/>
-                          </a:solidFill>
-                        </a:rPr>
-                        <a:t> &gt; </a:t>
-                      </a:r>
-                      <a:r>
-                        <a:rPr lang="ko-KR" altLang="en-US" sz="1600" dirty="0">
-                          <a:solidFill>
-                            <a:schemeClr val="tx1"/>
-                          </a:solidFill>
-                        </a:rPr>
-                        <a:t>로그인 </a:t>
-                      </a:r>
-                      <a:r>
-                        <a:rPr lang="en-US" altLang="ko-KR" sz="1600" dirty="0">
-                          <a:solidFill>
-                            <a:schemeClr val="tx1"/>
-                          </a:solidFill>
-                        </a:rPr>
-                        <a:t>&gt; </a:t>
-                      </a:r>
-                      <a:r>
-                        <a:rPr lang="ko-KR" altLang="en-US" sz="1600" dirty="0">
-                          <a:solidFill>
-                            <a:schemeClr val="tx1"/>
-                          </a:solidFill>
-                        </a:rPr>
-                        <a:t>회원가입 </a:t>
-                      </a:r>
-                      <a:r>
-                        <a:rPr lang="en-US" altLang="ko-KR" sz="1600" dirty="0">
-                          <a:solidFill>
-                            <a:schemeClr val="tx1"/>
-                          </a:solidFill>
-                        </a:rPr>
-                        <a:t>&gt; </a:t>
-                      </a:r>
-                      <a:r>
-                        <a:rPr lang="ko-KR" altLang="en-US" sz="1600" dirty="0">
-                          <a:solidFill>
-                            <a:schemeClr val="tx1"/>
-                          </a:solidFill>
-                        </a:rPr>
-                        <a:t>약관동의</a:t>
-                      </a:r>
                     </a:p>
                   </a:txBody>
                   <a:tcPr>
@@ -7569,7 +7682,7 @@
                     <a:p>
                       <a:pPr algn="ctr" latinLnBrk="1">
                         <a:lnSpc>
-                          <a:spcPct val="175000"/>
+                          <a:spcPct val="100000"/>
                         </a:lnSpc>
                       </a:pPr>
                       <a:r>
@@ -7641,7 +7754,7 @@
           <p:nvPr>
             <p:extLst>
               <p:ext uri="{D42A27DB-BD31-4B8C-83A1-F6EECF244321}">
-                <p14:modId xmlns:p14="http://schemas.microsoft.com/office/powerpoint/2010/main" val="2545892999"/>
+                <p14:modId xmlns:p14="http://schemas.microsoft.com/office/powerpoint/2010/main" val="675951176"/>
               </p:ext>
             </p:extLst>
           </p:nvPr>
@@ -10064,14 +10177,14 @@
           <p:nvPr>
             <p:extLst>
               <p:ext uri="{D42A27DB-BD31-4B8C-83A1-F6EECF244321}">
-                <p14:modId xmlns:p14="http://schemas.microsoft.com/office/powerpoint/2010/main" val="772574936"/>
+                <p14:modId xmlns:p14="http://schemas.microsoft.com/office/powerpoint/2010/main" val="3620262866"/>
               </p:ext>
             </p:extLst>
           </p:nvPr>
         </p:nvGraphicFramePr>
         <p:xfrm>
           <a:off x="0" y="0"/>
-          <a:ext cx="12192000" cy="889000"/>
+          <a:ext cx="12192000" cy="741680"/>
         </p:xfrm>
         <a:graphic>
           <a:graphicData uri="http://schemas.openxmlformats.org/drawingml/2006/table">
@@ -10377,7 +10490,7 @@
                     <a:p>
                       <a:pPr algn="ctr" latinLnBrk="1">
                         <a:lnSpc>
-                          <a:spcPct val="150000"/>
+                          <a:spcPct val="100000"/>
                         </a:lnSpc>
                       </a:pPr>
                       <a:r>
@@ -10386,7 +10499,7 @@
                             <a:schemeClr val="tx1"/>
                           </a:solidFill>
                         </a:rPr>
-                        <a:t>F-17</a:t>
+                        <a:t>PS-front-</a:t>
                       </a:r>
                       <a:endParaRPr lang="ko-KR" altLang="en-US" sz="1600" dirty="0">
                         <a:solidFill>
@@ -10442,7 +10555,7 @@
                     <a:p>
                       <a:pPr algn="ctr" latinLnBrk="1">
                         <a:lnSpc>
-                          <a:spcPct val="150000"/>
+                          <a:spcPct val="100000"/>
                         </a:lnSpc>
                       </a:pPr>
                       <a:r>
@@ -10505,23 +10618,11 @@
                     <a:bodyPr/>
                     <a:lstStyle/>
                     <a:p>
-                      <a:pPr algn="ctr" latinLnBrk="1"/>
-                      <a:r>
-                        <a:rPr lang="en-US" altLang="ko-KR" sz="1400" dirty="0" err="1">
-                          <a:solidFill>
-                            <a:schemeClr val="tx1"/>
-                          </a:solidFill>
-                        </a:rPr>
-                        <a:t>Gnb</a:t>
-                      </a:r>
-                      <a:r>
-                        <a:rPr lang="en-US" altLang="ko-KR" sz="1400" dirty="0">
-                          <a:solidFill>
-                            <a:schemeClr val="tx1"/>
-                          </a:solidFill>
-                        </a:rPr>
-                        <a:t> &gt; </a:t>
-                      </a:r>
+                      <a:pPr algn="ctr" latinLnBrk="1">
+                        <a:lnSpc>
+                          <a:spcPct val="100000"/>
+                        </a:lnSpc>
+                      </a:pPr>
                       <a:r>
                         <a:rPr lang="ko-KR" altLang="en-US" sz="1400" dirty="0">
                           <a:solidFill>
@@ -10567,81 +10668,6 @@
                           <a:schemeClr val="tx1"/>
                         </a:solidFill>
                       </a:endParaRPr>
-                    </a:p>
-                    <a:p>
-                      <a:pPr algn="ctr" latinLnBrk="1"/>
-                      <a:r>
-                        <a:rPr lang="en-US" altLang="ko-KR" sz="1400" dirty="0" err="1">
-                          <a:solidFill>
-                            <a:schemeClr val="tx1"/>
-                          </a:solidFill>
-                        </a:rPr>
-                        <a:t>Gnb</a:t>
-                      </a:r>
-                      <a:r>
-                        <a:rPr lang="en-US" altLang="ko-KR" sz="1400" dirty="0">
-                          <a:solidFill>
-                            <a:schemeClr val="tx1"/>
-                          </a:solidFill>
-                        </a:rPr>
-                        <a:t> &gt; </a:t>
-                      </a:r>
-                      <a:r>
-                        <a:rPr lang="ko-KR" altLang="en-US" sz="1400" dirty="0">
-                          <a:solidFill>
-                            <a:schemeClr val="tx1"/>
-                          </a:solidFill>
-                        </a:rPr>
-                        <a:t>로그인 </a:t>
-                      </a:r>
-                      <a:r>
-                        <a:rPr lang="en-US" altLang="ko-KR" sz="1400" dirty="0">
-                          <a:solidFill>
-                            <a:schemeClr val="tx1"/>
-                          </a:solidFill>
-                        </a:rPr>
-                        <a:t>&gt; </a:t>
-                      </a:r>
-                      <a:r>
-                        <a:rPr lang="ko-KR" altLang="en-US" sz="1400" dirty="0">
-                          <a:solidFill>
-                            <a:schemeClr val="tx1"/>
-                          </a:solidFill>
-                        </a:rPr>
-                        <a:t>회원가입 </a:t>
-                      </a:r>
-                      <a:r>
-                        <a:rPr lang="en-US" altLang="ko-KR" sz="1400" dirty="0">
-                          <a:solidFill>
-                            <a:schemeClr val="tx1"/>
-                          </a:solidFill>
-                        </a:rPr>
-                        <a:t>&gt; </a:t>
-                      </a:r>
-                      <a:r>
-                        <a:rPr lang="ko-KR" altLang="en-US" sz="1400" dirty="0">
-                          <a:solidFill>
-                            <a:schemeClr val="tx1"/>
-                          </a:solidFill>
-                        </a:rPr>
-                        <a:t>약관동의 </a:t>
-                      </a:r>
-                      <a:r>
-                        <a:rPr lang="en-US" altLang="ko-KR" sz="1400" dirty="0">
-                          <a:solidFill>
-                            <a:schemeClr val="tx1"/>
-                          </a:solidFill>
-                        </a:rPr>
-                        <a:t>&gt; </a:t>
-                      </a:r>
-                      <a:r>
-                        <a:rPr lang="ko-KR" altLang="en-US" sz="1400" dirty="0">
-                          <a:solidFill>
-                            <a:schemeClr val="tx1"/>
-                          </a:solidFill>
-                        </a:rPr>
-                        <a:t>정보입력</a:t>
-                      </a:r>
                     </a:p>
                   </a:txBody>
                   <a:tcPr>
@@ -10691,7 +10717,7 @@
                     <a:p>
                       <a:pPr algn="ctr" latinLnBrk="1">
                         <a:lnSpc>
-                          <a:spcPct val="150000"/>
+                          <a:spcPct val="100000"/>
                         </a:lnSpc>
                       </a:pPr>
                       <a:r>
@@ -15885,7 +15911,7 @@
           <p:nvPr>
             <p:extLst>
               <p:ext uri="{D42A27DB-BD31-4B8C-83A1-F6EECF244321}">
-                <p14:modId xmlns:p14="http://schemas.microsoft.com/office/powerpoint/2010/main" val="1666789297"/>
+                <p14:modId xmlns:p14="http://schemas.microsoft.com/office/powerpoint/2010/main" val="3254540139"/>
               </p:ext>
             </p:extLst>
           </p:nvPr>
@@ -16311,22 +16337,6 @@
                     <a:lstStyle/>
                     <a:p>
                       <a:pPr algn="ctr" latinLnBrk="1"/>
-                      <a:r>
-                        <a:rPr lang="en-US" altLang="ko-KR" sz="1600" dirty="0" err="1">
-                          <a:solidFill>
-                            <a:schemeClr val="tx1"/>
-                          </a:solidFill>
-                        </a:rPr>
-                        <a:t>Gnb</a:t>
-                      </a:r>
-                      <a:r>
-                        <a:rPr lang="en-US" altLang="ko-KR" sz="1600" dirty="0">
-                          <a:solidFill>
-                            <a:schemeClr val="tx1"/>
-                          </a:solidFill>
-                        </a:rPr>
-                        <a:t> &gt; </a:t>
-                      </a:r>
                       <a:r>
                         <a:rPr lang="ko-KR" altLang="en-US" sz="1600" dirty="0">
                           <a:solidFill>
@@ -32314,7 +32324,7 @@
           <p:nvPr>
             <p:extLst>
               <p:ext uri="{D42A27DB-BD31-4B8C-83A1-F6EECF244321}">
-                <p14:modId xmlns:p14="http://schemas.microsoft.com/office/powerpoint/2010/main" val="1331198801"/>
+                <p14:modId xmlns:p14="http://schemas.microsoft.com/office/powerpoint/2010/main" val="20321977"/>
               </p:ext>
             </p:extLst>
           </p:nvPr>
@@ -32749,18 +32759,13 @@
                     <a:p>
                       <a:pPr algn="ctr" latinLnBrk="1"/>
                       <a:r>
-                        <a:rPr lang="en-US" altLang="ko-KR" sz="1600" dirty="0" err="1">
-                          <a:solidFill>
-                            <a:schemeClr val="tx1"/>
-                          </a:solidFill>
-                        </a:rPr>
-                        <a:t>Gnb</a:t>
-                      </a:r>
-                      <a:endParaRPr lang="ko-KR" altLang="en-US" sz="1600" dirty="0">
-                        <a:solidFill>
-                          <a:schemeClr val="tx1"/>
-                        </a:solidFill>
-                      </a:endParaRPr>
+                        <a:rPr lang="ko-KR" altLang="en-US" sz="1600" dirty="0">
+                          <a:solidFill>
+                            <a:schemeClr val="tx1"/>
+                          </a:solidFill>
+                        </a:rPr>
+                        <a:t>공통영역</a:t>
+                      </a:r>
                     </a:p>
                   </a:txBody>
                   <a:tcPr>
@@ -32878,14 +32883,14 @@
           <p:nvPr>
             <p:extLst>
               <p:ext uri="{D42A27DB-BD31-4B8C-83A1-F6EECF244321}">
-                <p14:modId xmlns:p14="http://schemas.microsoft.com/office/powerpoint/2010/main" val="2155781300"/>
+                <p14:modId xmlns:p14="http://schemas.microsoft.com/office/powerpoint/2010/main" val="2442662595"/>
               </p:ext>
             </p:extLst>
           </p:nvPr>
         </p:nvGraphicFramePr>
         <p:xfrm>
           <a:off x="7292972" y="793154"/>
-          <a:ext cx="4899028" cy="4442145"/>
+          <a:ext cx="4899028" cy="4651695"/>
         </p:xfrm>
         <a:graphic>
           <a:graphicData uri="http://schemas.openxmlformats.org/drawingml/2006/table">
@@ -33956,6 +33961,55 @@
                           <a:schemeClr val="tx1"/>
                         </a:solidFill>
                       </a:endParaRPr>
+                    </a:p>
+                    <a:p>
+                      <a:pPr marL="0" indent="0" algn="l" latinLnBrk="1">
+                        <a:lnSpc>
+                          <a:spcPct val="125000"/>
+                        </a:lnSpc>
+                        <a:buFont typeface="Arial" panose="020B0604020202020204" pitchFamily="34" charset="0"/>
+                        <a:buNone/>
+                      </a:pPr>
+                      <a:r>
+                        <a:rPr lang="en-US" altLang="ko-KR" sz="1100" baseline="0" dirty="0">
+                          <a:solidFill>
+                            <a:schemeClr val="tx1"/>
+                          </a:solidFill>
+                        </a:rPr>
+                        <a:t> - </a:t>
+                      </a:r>
+                      <a:r>
+                        <a:rPr lang="ko-KR" altLang="en-US" sz="1100" baseline="0" dirty="0">
+                          <a:solidFill>
+                            <a:schemeClr val="tx1"/>
+                          </a:solidFill>
+                        </a:rPr>
+                        <a:t>로그인 </a:t>
+                      </a:r>
+                      <a:r>
+                        <a:rPr lang="en-US" altLang="ko-KR" sz="1100" baseline="0" dirty="0">
+                          <a:solidFill>
+                            <a:schemeClr val="tx1"/>
+                          </a:solidFill>
+                        </a:rPr>
+                        <a:t>-&gt; </a:t>
+                      </a:r>
+                      <a:r>
+                        <a:rPr lang="ko-KR" altLang="en-US" sz="1100" baseline="0" dirty="0">
+                          <a:solidFill>
+                            <a:schemeClr val="tx1"/>
+                          </a:solidFill>
+                        </a:rPr>
+                        <a:t>로그아웃 상태로 변경</a:t>
+                      </a:r>
+                      <a:r>
+                        <a:rPr lang="en-US" altLang="ko-KR" sz="1100" baseline="0" dirty="0">
+                          <a:solidFill>
+                            <a:schemeClr val="tx1"/>
+                          </a:solidFill>
+                        </a:rPr>
+                        <a:t>.</a:t>
+                      </a:r>
                     </a:p>
                   </a:txBody>
                   <a:tcPr>
@@ -36241,14 +36295,14 @@
           <p:nvPr>
             <p:extLst>
               <p:ext uri="{D42A27DB-BD31-4B8C-83A1-F6EECF244321}">
-                <p14:modId xmlns:p14="http://schemas.microsoft.com/office/powerpoint/2010/main" val="256827186"/>
+                <p14:modId xmlns:p14="http://schemas.microsoft.com/office/powerpoint/2010/main" val="1548638996"/>
               </p:ext>
             </p:extLst>
           </p:nvPr>
         </p:nvGraphicFramePr>
         <p:xfrm>
           <a:off x="7292972" y="793154"/>
-          <a:ext cx="4899028" cy="2534922"/>
+          <a:ext cx="4899028" cy="3791271"/>
         </p:xfrm>
         <a:graphic>
           <a:graphicData uri="http://schemas.openxmlformats.org/drawingml/2006/table">
@@ -36617,7 +36671,23 @@
                             <a:schemeClr val="tx1"/>
                           </a:solidFill>
                         </a:rPr>
-                        <a:t>도서 소개</a:t>
+                        <a:t>슬라이드 배너</a:t>
+                      </a:r>
+                      <a:r>
+                        <a:rPr lang="en-US" altLang="ko-KR" sz="1100" dirty="0">
+                          <a:solidFill>
+                            <a:schemeClr val="tx1"/>
+                          </a:solidFill>
+                        </a:rPr>
+                        <a:t> </a:t>
+                      </a:r>
+                      <a:r>
+                        <a:rPr lang="ko-KR" altLang="en-US" sz="1100" dirty="0">
+                          <a:solidFill>
+                            <a:schemeClr val="tx1"/>
+                          </a:solidFill>
+                        </a:rPr>
+                        <a:t>버튼</a:t>
                       </a:r>
                       <a:endParaRPr lang="en-US" altLang="ko-KR" sz="1100" dirty="0">
                         <a:solidFill>
@@ -36647,7 +36717,7 @@
                             <a:schemeClr val="tx1"/>
                           </a:solidFill>
                         </a:rPr>
-                        <a:t>표지 클릭 시 상세 페이지로 이동</a:t>
+                        <a:t>왼쪽으로 이동</a:t>
                       </a:r>
                       <a:r>
                         <a:rPr lang="en-US" altLang="ko-KR" sz="1100" dirty="0">
@@ -36833,30 +36903,14 @@
                         <a:buChar char="•"/>
                       </a:pPr>
                       <a:r>
-                        <a:rPr lang="ko-KR" altLang="en-US" sz="1100" dirty="0">
-                          <a:solidFill>
-                            <a:schemeClr val="tx1"/>
-                          </a:solidFill>
-                        </a:rPr>
-                        <a:t>공지사항</a:t>
-                      </a:r>
-                      <a:r>
-                        <a:rPr lang="en-US" altLang="ko-KR" sz="1100" dirty="0">
-                          <a:solidFill>
-                            <a:schemeClr val="tx1"/>
-                          </a:solidFill>
-                        </a:rPr>
-                        <a:t>/</a:t>
-                      </a:r>
-                      <a:r>
-                        <a:rPr lang="ko-KR" altLang="en-US" sz="1100" dirty="0">
-                          <a:solidFill>
-                            <a:schemeClr val="tx1"/>
-                          </a:solidFill>
-                        </a:rPr>
-                        <a:t>이벤트</a:t>
-                      </a:r>
-                      <a:endParaRPr lang="en-US" altLang="ko-KR" sz="1100" dirty="0">
+                        <a:rPr lang="ko-KR" altLang="en-US" sz="1100" baseline="0" dirty="0">
+                          <a:solidFill>
+                            <a:schemeClr val="tx1"/>
+                          </a:solidFill>
+                        </a:rPr>
+                        <a:t>슬라이드 배너</a:t>
+                      </a:r>
+                      <a:endParaRPr lang="en-US" altLang="ko-KR" sz="1100" baseline="0" dirty="0">
                         <a:solidFill>
                           <a:schemeClr val="tx1"/>
                         </a:solidFill>
@@ -36871,34 +36925,29 @@
                         <a:buNone/>
                       </a:pPr>
                       <a:r>
-                        <a:rPr lang="en-US" altLang="ko-KR" sz="1100" dirty="0">
-                          <a:solidFill>
-                            <a:schemeClr val="tx1"/>
-                          </a:solidFill>
-                        </a:rPr>
-                        <a:t> - Title</a:t>
-                      </a:r>
-                      <a:r>
-                        <a:rPr lang="ko-KR" altLang="en-US" sz="1100" dirty="0">
-                          <a:solidFill>
-                            <a:schemeClr val="tx1"/>
-                          </a:solidFill>
-                        </a:rPr>
-                        <a:t> 클릭 시 상세 페이지로 이동</a:t>
-                      </a:r>
-                      <a:r>
-                        <a:rPr lang="en-US" altLang="ko-KR" sz="1100" dirty="0">
+                        <a:rPr lang="en-US" altLang="ko-KR" sz="1100" baseline="0" dirty="0">
+                          <a:solidFill>
+                            <a:schemeClr val="tx1"/>
+                          </a:solidFill>
+                        </a:rPr>
+                        <a:t> - </a:t>
+                      </a:r>
+                      <a:r>
+                        <a:rPr lang="ko-KR" altLang="en-US" sz="1100" baseline="0" dirty="0">
+                          <a:solidFill>
+                            <a:schemeClr val="tx1"/>
+                          </a:solidFill>
+                        </a:rPr>
+                        <a:t>책 표지 클릭 시 상세 페이지로 이동</a:t>
+                      </a:r>
+                      <a:r>
+                        <a:rPr lang="en-US" altLang="ko-KR" sz="1100" baseline="0" dirty="0">
                           <a:solidFill>
                             <a:schemeClr val="tx1"/>
                           </a:solidFill>
                         </a:rPr>
                         <a:t>.</a:t>
                       </a:r>
-                      <a:endParaRPr lang="en-US" altLang="ko-KR" sz="1100" baseline="0" dirty="0">
-                        <a:solidFill>
-                          <a:schemeClr val="tx1"/>
-                        </a:solidFill>
-                      </a:endParaRPr>
                     </a:p>
                   </a:txBody>
                   <a:tcPr>
@@ -37080,7 +37129,7 @@
                             <a:schemeClr val="tx1"/>
                           </a:solidFill>
                         </a:rPr>
-                        <a:t>배너</a:t>
+                        <a:t>슬라이드 배너 버튼</a:t>
                       </a:r>
                       <a:endParaRPr lang="en-US" altLang="ko-KR" sz="1100" baseline="0" dirty="0">
                         <a:solidFill>
@@ -37110,56 +37159,7 @@
                             <a:schemeClr val="tx1"/>
                           </a:solidFill>
                         </a:rPr>
-                        <a:t>이벤트</a:t>
-                      </a:r>
-                      <a:r>
-                        <a:rPr lang="en-US" altLang="ko-KR" sz="1100" baseline="0" dirty="0">
-                          <a:solidFill>
-                            <a:schemeClr val="tx1"/>
-                          </a:solidFill>
-                        </a:rPr>
-                        <a:t> </a:t>
-                      </a:r>
-                      <a:r>
-                        <a:rPr lang="ko-KR" altLang="en-US" sz="1100" baseline="0" dirty="0">
-                          <a:solidFill>
-                            <a:schemeClr val="tx1"/>
-                          </a:solidFill>
-                        </a:rPr>
-                        <a:t>관련 이미지</a:t>
-                      </a:r>
-                      <a:r>
-                        <a:rPr lang="en-US" altLang="ko-KR" sz="1100" baseline="0" dirty="0">
-                          <a:solidFill>
-                            <a:schemeClr val="tx1"/>
-                          </a:solidFill>
-                        </a:rPr>
-                        <a:t>.</a:t>
-                      </a:r>
-                    </a:p>
-                    <a:p>
-                      <a:pPr marL="0" indent="0" algn="l" latinLnBrk="1">
-                        <a:lnSpc>
-                          <a:spcPct val="125000"/>
-                        </a:lnSpc>
-                        <a:buFont typeface="Arial" panose="020B0604020202020204" pitchFamily="34" charset="0"/>
-                        <a:buNone/>
-                      </a:pPr>
-                      <a:r>
-                        <a:rPr lang="en-US" altLang="ko-KR" sz="1100" baseline="0" dirty="0">
-                          <a:solidFill>
-                            <a:schemeClr val="tx1"/>
-                          </a:solidFill>
-                        </a:rPr>
-                        <a:t> - </a:t>
-                      </a:r>
-                      <a:r>
-                        <a:rPr lang="ko-KR" altLang="en-US" sz="1100" baseline="0" dirty="0">
-                          <a:solidFill>
-                            <a:schemeClr val="tx1"/>
-                          </a:solidFill>
-                        </a:rPr>
-                        <a:t>배너 클릭 시 상세 페이지로 이동</a:t>
+                        <a:t>오른쪽으로 이동</a:t>
                       </a:r>
                       <a:r>
                         <a:rPr lang="en-US" altLang="ko-KR" sz="1100" baseline="0" dirty="0">
@@ -37345,13 +37345,34 @@
                         <a:buChar char="•"/>
                       </a:pPr>
                       <a:r>
+                        <a:rPr lang="ko-KR" altLang="en-US" sz="1100" dirty="0">
+                          <a:solidFill>
+                            <a:schemeClr val="tx1"/>
+                          </a:solidFill>
+                        </a:rPr>
+                        <a:t>공지사항</a:t>
+                      </a:r>
+                      <a:r>
                         <a:rPr lang="en-US" altLang="ko-KR" sz="1100" dirty="0">
                           <a:solidFill>
                             <a:schemeClr val="tx1"/>
                           </a:solidFill>
                         </a:rPr>
-                        <a:t>SNS</a:t>
-                      </a:r>
+                        <a:t>/</a:t>
+                      </a:r>
+                      <a:r>
+                        <a:rPr lang="ko-KR" altLang="en-US" sz="1100" dirty="0">
+                          <a:solidFill>
+                            <a:schemeClr val="tx1"/>
+                          </a:solidFill>
+                        </a:rPr>
+                        <a:t>이벤트</a:t>
+                      </a:r>
+                      <a:endParaRPr lang="en-US" altLang="ko-KR" sz="1100" dirty="0">
+                        <a:solidFill>
+                          <a:schemeClr val="tx1"/>
+                        </a:solidFill>
+                      </a:endParaRPr>
                     </a:p>
                     <a:p>
                       <a:pPr marL="0" indent="0" algn="l" latinLnBrk="1">
@@ -37375,7 +37396,7 @@
                             <a:schemeClr val="tx1"/>
                           </a:solidFill>
                         </a:rPr>
-                        <a:t>출판사 </a:t>
+                        <a:t>제목 클릭 시 상세 페이지로 이동</a:t>
                       </a:r>
                       <a:r>
                         <a:rPr lang="en-US" altLang="ko-KR" sz="1100" dirty="0">
@@ -37383,24 +37404,13 @@
                             <a:schemeClr val="tx1"/>
                           </a:solidFill>
                         </a:rPr>
-                        <a:t>SNS</a:t>
-                      </a:r>
-                      <a:r>
-                        <a:rPr lang="ko-KR" altLang="en-US" sz="1100" dirty="0">
-                          <a:solidFill>
-                            <a:schemeClr val="tx1"/>
-                          </a:solidFill>
-                        </a:rPr>
-                        <a:t> 페이지로 이동</a:t>
-                      </a:r>
-                      <a:r>
-                        <a:rPr lang="en-US" altLang="ko-KR" sz="1100" dirty="0">
-                          <a:solidFill>
-                            <a:schemeClr val="tx1"/>
-                          </a:solidFill>
-                        </a:rPr>
                         <a:t>.</a:t>
                       </a:r>
+                      <a:endParaRPr lang="en-US" altLang="ko-KR" sz="1100" baseline="0" dirty="0">
+                        <a:solidFill>
+                          <a:schemeClr val="tx1"/>
+                        </a:solidFill>
+                      </a:endParaRPr>
                     </a:p>
                   </a:txBody>
                   <a:tcPr>
@@ -37446,6 +37456,704 @@
                 <a:extLst>
                   <a:ext uri="{0D108BD9-81ED-4DB2-BD59-A6C34878D82A}">
                     <a16:rowId xmlns:a16="http://schemas.microsoft.com/office/drawing/2014/main" val="247755150"/>
+                  </a:ext>
+                </a:extLst>
+              </a:tr>
+              <a:tr h="370840">
+                <a:tc>
+                  <a:txBody>
+                    <a:bodyPr/>
+                    <a:lstStyle/>
+                    <a:p>
+                      <a:pPr algn="ctr" latinLnBrk="1"/>
+                      <a:r>
+                        <a:rPr lang="en-US" altLang="ko-KR" sz="1100" dirty="0">
+                          <a:solidFill>
+                            <a:schemeClr val="tx1"/>
+                          </a:solidFill>
+                        </a:rPr>
+                        <a:t>5</a:t>
+                      </a:r>
+                      <a:endParaRPr lang="ko-KR" altLang="en-US" sz="1100" dirty="0">
+                        <a:solidFill>
+                          <a:schemeClr val="tx1"/>
+                        </a:solidFill>
+                      </a:endParaRPr>
+                    </a:p>
+                  </a:txBody>
+                  <a:tcPr>
+                    <a:lnL w="12700" cap="flat" cmpd="sng" algn="ctr">
+                      <a:solidFill>
+                        <a:schemeClr val="tx1"/>
+                      </a:solidFill>
+                      <a:prstDash val="solid"/>
+                      <a:round/>
+                      <a:headEnd type="none" w="med" len="med"/>
+                      <a:tailEnd type="none" w="med" len="med"/>
+                    </a:lnL>
+                    <a:lnR w="12700" cap="flat" cmpd="sng" algn="ctr">
+                      <a:solidFill>
+                        <a:schemeClr val="tx1"/>
+                      </a:solidFill>
+                      <a:prstDash val="solid"/>
+                      <a:round/>
+                      <a:headEnd type="none" w="med" len="med"/>
+                      <a:tailEnd type="none" w="med" len="med"/>
+                    </a:lnR>
+                    <a:lnT w="12700" cap="flat" cmpd="sng" algn="ctr">
+                      <a:solidFill>
+                        <a:schemeClr val="tx1"/>
+                      </a:solidFill>
+                      <a:prstDash val="solid"/>
+                      <a:round/>
+                      <a:headEnd type="none" w="med" len="med"/>
+                      <a:tailEnd type="none" w="med" len="med"/>
+                    </a:lnT>
+                    <a:lnB w="12700" cap="flat" cmpd="sng" algn="ctr">
+                      <a:solidFill>
+                        <a:schemeClr val="tx1"/>
+                      </a:solidFill>
+                      <a:prstDash val="solid"/>
+                      <a:round/>
+                      <a:headEnd type="none" w="med" len="med"/>
+                      <a:tailEnd type="none" w="med" len="med"/>
+                    </a:lnB>
+                    <a:noFill/>
+                  </a:tcPr>
+                </a:tc>
+                <a:tc>
+                  <a:txBody>
+                    <a:bodyPr/>
+                    <a:lstStyle/>
+                    <a:p>
+                      <a:pPr algn="ctr" latinLnBrk="1"/>
+                      <a:endParaRPr lang="ko-KR" altLang="en-US" sz="1100" dirty="0">
+                        <a:solidFill>
+                          <a:schemeClr val="tx1"/>
+                        </a:solidFill>
+                      </a:endParaRPr>
+                    </a:p>
+                  </a:txBody>
+                  <a:tcPr>
+                    <a:lnL w="12700" cap="flat" cmpd="sng" algn="ctr">
+                      <a:solidFill>
+                        <a:schemeClr val="tx1"/>
+                      </a:solidFill>
+                      <a:prstDash val="solid"/>
+                      <a:round/>
+                      <a:headEnd type="none" w="med" len="med"/>
+                      <a:tailEnd type="none" w="med" len="med"/>
+                    </a:lnL>
+                    <a:lnR w="12700" cap="flat" cmpd="sng" algn="ctr">
+                      <a:solidFill>
+                        <a:schemeClr val="tx1"/>
+                      </a:solidFill>
+                      <a:prstDash val="solid"/>
+                      <a:round/>
+                      <a:headEnd type="none" w="med" len="med"/>
+                      <a:tailEnd type="none" w="med" len="med"/>
+                    </a:lnR>
+                    <a:lnT w="12700" cap="flat" cmpd="sng" algn="ctr">
+                      <a:solidFill>
+                        <a:schemeClr val="tx1"/>
+                      </a:solidFill>
+                      <a:prstDash val="solid"/>
+                      <a:round/>
+                      <a:headEnd type="none" w="med" len="med"/>
+                      <a:tailEnd type="none" w="med" len="med"/>
+                    </a:lnT>
+                    <a:lnB w="12700" cap="flat" cmpd="sng" algn="ctr">
+                      <a:solidFill>
+                        <a:schemeClr val="tx1"/>
+                      </a:solidFill>
+                      <a:prstDash val="solid"/>
+                      <a:round/>
+                      <a:headEnd type="none" w="med" len="med"/>
+                      <a:tailEnd type="none" w="med" len="med"/>
+                    </a:lnB>
+                    <a:noFill/>
+                  </a:tcPr>
+                </a:tc>
+                <a:tc>
+                  <a:txBody>
+                    <a:bodyPr/>
+                    <a:lstStyle/>
+                    <a:p>
+                      <a:pPr marL="171450" indent="-171450" algn="l" latinLnBrk="1">
+                        <a:lnSpc>
+                          <a:spcPct val="125000"/>
+                        </a:lnSpc>
+                        <a:buFont typeface="Arial" panose="020B0604020202020204" pitchFamily="34" charset="0"/>
+                        <a:buChar char="•"/>
+                      </a:pPr>
+                      <a:r>
+                        <a:rPr lang="en-US" altLang="ko-KR" sz="1100" dirty="0">
+                          <a:solidFill>
+                            <a:schemeClr val="tx1"/>
+                          </a:solidFill>
+                        </a:rPr>
+                        <a:t>(+) </a:t>
+                      </a:r>
+                      <a:r>
+                        <a:rPr lang="ko-KR" altLang="en-US" sz="1100" dirty="0">
+                          <a:solidFill>
+                            <a:schemeClr val="tx1"/>
+                          </a:solidFill>
+                        </a:rPr>
+                        <a:t>버튼</a:t>
+                      </a:r>
+                      <a:endParaRPr lang="en-US" altLang="ko-KR" sz="1100" dirty="0">
+                        <a:solidFill>
+                          <a:schemeClr val="tx1"/>
+                        </a:solidFill>
+                      </a:endParaRPr>
+                    </a:p>
+                    <a:p>
+                      <a:pPr marL="0" indent="0" algn="l" latinLnBrk="1">
+                        <a:lnSpc>
+                          <a:spcPct val="125000"/>
+                        </a:lnSpc>
+                        <a:buFont typeface="Arial" panose="020B0604020202020204" pitchFamily="34" charset="0"/>
+                        <a:buNone/>
+                      </a:pPr>
+                      <a:r>
+                        <a:rPr lang="en-US" altLang="ko-KR" sz="1100" dirty="0">
+                          <a:solidFill>
+                            <a:schemeClr val="tx1"/>
+                          </a:solidFill>
+                        </a:rPr>
+                        <a:t> - </a:t>
+                      </a:r>
+                      <a:r>
+                        <a:rPr lang="ko-KR" altLang="en-US" sz="1100" dirty="0">
+                          <a:solidFill>
+                            <a:schemeClr val="tx1"/>
+                          </a:solidFill>
+                        </a:rPr>
+                        <a:t>버튼 클릭 시 공지사항</a:t>
+                      </a:r>
+                      <a:r>
+                        <a:rPr lang="en-US" altLang="ko-KR" sz="1100" dirty="0">
+                          <a:solidFill>
+                            <a:schemeClr val="tx1"/>
+                          </a:solidFill>
+                        </a:rPr>
+                        <a:t>/</a:t>
+                      </a:r>
+                      <a:r>
+                        <a:rPr lang="ko-KR" altLang="en-US" sz="1100" dirty="0">
+                          <a:solidFill>
+                            <a:schemeClr val="tx1"/>
+                          </a:solidFill>
+                        </a:rPr>
+                        <a:t>이벤트로 이동</a:t>
+                      </a:r>
+                      <a:r>
+                        <a:rPr lang="en-US" altLang="ko-KR" sz="1100" dirty="0">
+                          <a:solidFill>
+                            <a:schemeClr val="tx1"/>
+                          </a:solidFill>
+                        </a:rPr>
+                        <a:t>.</a:t>
+                      </a:r>
+                    </a:p>
+                  </a:txBody>
+                  <a:tcPr>
+                    <a:lnL w="12700" cap="flat" cmpd="sng" algn="ctr">
+                      <a:solidFill>
+                        <a:schemeClr val="tx1"/>
+                      </a:solidFill>
+                      <a:prstDash val="solid"/>
+                      <a:round/>
+                      <a:headEnd type="none" w="med" len="med"/>
+                      <a:tailEnd type="none" w="med" len="med"/>
+                    </a:lnL>
+                    <a:lnR w="12700" cap="flat" cmpd="sng" algn="ctr">
+                      <a:solidFill>
+                        <a:schemeClr val="tx1"/>
+                      </a:solidFill>
+                      <a:prstDash val="solid"/>
+                      <a:round/>
+                      <a:headEnd type="none" w="med" len="med"/>
+                      <a:tailEnd type="none" w="med" len="med"/>
+                    </a:lnR>
+                    <a:lnT w="12700" cap="flat" cmpd="sng" algn="ctr">
+                      <a:solidFill>
+                        <a:schemeClr val="tx1"/>
+                      </a:solidFill>
+                      <a:prstDash val="solid"/>
+                      <a:round/>
+                      <a:headEnd type="none" w="med" len="med"/>
+                      <a:tailEnd type="none" w="med" len="med"/>
+                    </a:lnT>
+                    <a:lnB w="12700" cap="flat" cmpd="sng" algn="ctr">
+                      <a:solidFill>
+                        <a:schemeClr val="tx1"/>
+                      </a:solidFill>
+                      <a:prstDash val="solid"/>
+                      <a:round/>
+                      <a:headEnd type="none" w="med" len="med"/>
+                      <a:tailEnd type="none" w="med" len="med"/>
+                    </a:lnB>
+                    <a:noFill/>
+                  </a:tcPr>
+                </a:tc>
+                <a:extLst>
+                  <a:ext uri="{0D108BD9-81ED-4DB2-BD59-A6C34878D82A}">
+                    <a16:rowId xmlns:a16="http://schemas.microsoft.com/office/drawing/2014/main" val="2466352094"/>
+                  </a:ext>
+                </a:extLst>
+              </a:tr>
+              <a:tr h="370840">
+                <a:tc>
+                  <a:txBody>
+                    <a:bodyPr/>
+                    <a:lstStyle/>
+                    <a:p>
+                      <a:pPr algn="ctr" latinLnBrk="1"/>
+                      <a:r>
+                        <a:rPr lang="en-US" altLang="ko-KR" sz="1100" dirty="0">
+                          <a:solidFill>
+                            <a:schemeClr val="tx1"/>
+                          </a:solidFill>
+                        </a:rPr>
+                        <a:t>6</a:t>
+                      </a:r>
+                      <a:endParaRPr lang="ko-KR" altLang="en-US" sz="1100" dirty="0">
+                        <a:solidFill>
+                          <a:schemeClr val="tx1"/>
+                        </a:solidFill>
+                      </a:endParaRPr>
+                    </a:p>
+                  </a:txBody>
+                  <a:tcPr>
+                    <a:lnL w="12700" cap="flat" cmpd="sng" algn="ctr">
+                      <a:solidFill>
+                        <a:schemeClr val="tx1"/>
+                      </a:solidFill>
+                      <a:prstDash val="solid"/>
+                      <a:round/>
+                      <a:headEnd type="none" w="med" len="med"/>
+                      <a:tailEnd type="none" w="med" len="med"/>
+                    </a:lnL>
+                    <a:lnR w="12700" cap="flat" cmpd="sng" algn="ctr">
+                      <a:solidFill>
+                        <a:schemeClr val="tx1"/>
+                      </a:solidFill>
+                      <a:prstDash val="solid"/>
+                      <a:round/>
+                      <a:headEnd type="none" w="med" len="med"/>
+                      <a:tailEnd type="none" w="med" len="med"/>
+                    </a:lnR>
+                    <a:lnT w="12700" cap="flat" cmpd="sng" algn="ctr">
+                      <a:solidFill>
+                        <a:schemeClr val="tx1"/>
+                      </a:solidFill>
+                      <a:prstDash val="solid"/>
+                      <a:round/>
+                      <a:headEnd type="none" w="med" len="med"/>
+                      <a:tailEnd type="none" w="med" len="med"/>
+                    </a:lnT>
+                    <a:lnB w="12700" cap="flat" cmpd="sng" algn="ctr">
+                      <a:solidFill>
+                        <a:schemeClr val="tx1"/>
+                      </a:solidFill>
+                      <a:prstDash val="solid"/>
+                      <a:round/>
+                      <a:headEnd type="none" w="med" len="med"/>
+                      <a:tailEnd type="none" w="med" len="med"/>
+                    </a:lnB>
+                    <a:noFill/>
+                  </a:tcPr>
+                </a:tc>
+                <a:tc>
+                  <a:txBody>
+                    <a:bodyPr/>
+                    <a:lstStyle/>
+                    <a:p>
+                      <a:pPr algn="ctr" latinLnBrk="1"/>
+                      <a:endParaRPr lang="ko-KR" altLang="en-US" sz="1100" dirty="0">
+                        <a:solidFill>
+                          <a:schemeClr val="tx1"/>
+                        </a:solidFill>
+                      </a:endParaRPr>
+                    </a:p>
+                  </a:txBody>
+                  <a:tcPr>
+                    <a:lnL w="12700" cap="flat" cmpd="sng" algn="ctr">
+                      <a:solidFill>
+                        <a:schemeClr val="tx1"/>
+                      </a:solidFill>
+                      <a:prstDash val="solid"/>
+                      <a:round/>
+                      <a:headEnd type="none" w="med" len="med"/>
+                      <a:tailEnd type="none" w="med" len="med"/>
+                    </a:lnL>
+                    <a:lnR w="12700" cap="flat" cmpd="sng" algn="ctr">
+                      <a:solidFill>
+                        <a:schemeClr val="tx1"/>
+                      </a:solidFill>
+                      <a:prstDash val="solid"/>
+                      <a:round/>
+                      <a:headEnd type="none" w="med" len="med"/>
+                      <a:tailEnd type="none" w="med" len="med"/>
+                    </a:lnR>
+                    <a:lnT w="12700" cap="flat" cmpd="sng" algn="ctr">
+                      <a:solidFill>
+                        <a:schemeClr val="tx1"/>
+                      </a:solidFill>
+                      <a:prstDash val="solid"/>
+                      <a:round/>
+                      <a:headEnd type="none" w="med" len="med"/>
+                      <a:tailEnd type="none" w="med" len="med"/>
+                    </a:lnT>
+                    <a:lnB w="12700" cap="flat" cmpd="sng" algn="ctr">
+                      <a:solidFill>
+                        <a:schemeClr val="tx1"/>
+                      </a:solidFill>
+                      <a:prstDash val="solid"/>
+                      <a:round/>
+                      <a:headEnd type="none" w="med" len="med"/>
+                      <a:tailEnd type="none" w="med" len="med"/>
+                    </a:lnB>
+                    <a:noFill/>
+                  </a:tcPr>
+                </a:tc>
+                <a:tc>
+                  <a:txBody>
+                    <a:bodyPr/>
+                    <a:lstStyle/>
+                    <a:p>
+                      <a:pPr marL="182563" indent="-182563" algn="l" latinLnBrk="1">
+                        <a:lnSpc>
+                          <a:spcPct val="125000"/>
+                        </a:lnSpc>
+                        <a:buFont typeface="Arial" panose="020B0604020202020204" pitchFamily="34" charset="0"/>
+                        <a:buChar char="•"/>
+                      </a:pPr>
+                      <a:r>
+                        <a:rPr lang="ko-KR" altLang="en-US" sz="1100" baseline="0" dirty="0">
+                          <a:solidFill>
+                            <a:schemeClr val="tx1"/>
+                          </a:solidFill>
+                        </a:rPr>
+                        <a:t>이벤트 배너</a:t>
+                      </a:r>
+                      <a:endParaRPr lang="en-US" altLang="ko-KR" sz="1100" baseline="0" dirty="0">
+                        <a:solidFill>
+                          <a:schemeClr val="tx1"/>
+                        </a:solidFill>
+                      </a:endParaRPr>
+                    </a:p>
+                    <a:p>
+                      <a:pPr marL="0" indent="0" algn="l" latinLnBrk="1">
+                        <a:lnSpc>
+                          <a:spcPct val="125000"/>
+                        </a:lnSpc>
+                        <a:buFont typeface="Arial" panose="020B0604020202020204" pitchFamily="34" charset="0"/>
+                        <a:buNone/>
+                      </a:pPr>
+                      <a:r>
+                        <a:rPr lang="en-US" altLang="ko-KR" sz="1100" baseline="0" dirty="0">
+                          <a:solidFill>
+                            <a:schemeClr val="tx1"/>
+                          </a:solidFill>
+                        </a:rPr>
+                        <a:t>- </a:t>
+                      </a:r>
+                      <a:r>
+                        <a:rPr lang="ko-KR" altLang="en-US" sz="1100" baseline="0" dirty="0">
+                          <a:solidFill>
+                            <a:schemeClr val="tx1"/>
+                          </a:solidFill>
+                        </a:rPr>
+                        <a:t>배너 클릭 시 상세 페이지로 이동</a:t>
+                      </a:r>
+                      <a:r>
+                        <a:rPr lang="en-US" altLang="ko-KR" sz="1100" baseline="0" dirty="0">
+                          <a:solidFill>
+                            <a:schemeClr val="tx1"/>
+                          </a:solidFill>
+                        </a:rPr>
+                        <a:t>.</a:t>
+                      </a:r>
+                    </a:p>
+                  </a:txBody>
+                  <a:tcPr>
+                    <a:lnL w="12700" cap="flat" cmpd="sng" algn="ctr">
+                      <a:solidFill>
+                        <a:schemeClr val="tx1"/>
+                      </a:solidFill>
+                      <a:prstDash val="solid"/>
+                      <a:round/>
+                      <a:headEnd type="none" w="med" len="med"/>
+                      <a:tailEnd type="none" w="med" len="med"/>
+                    </a:lnL>
+                    <a:lnR w="12700" cap="flat" cmpd="sng" algn="ctr">
+                      <a:solidFill>
+                        <a:schemeClr val="tx1"/>
+                      </a:solidFill>
+                      <a:prstDash val="solid"/>
+                      <a:round/>
+                      <a:headEnd type="none" w="med" len="med"/>
+                      <a:tailEnd type="none" w="med" len="med"/>
+                    </a:lnR>
+                    <a:lnT w="12700" cap="flat" cmpd="sng" algn="ctr">
+                      <a:solidFill>
+                        <a:schemeClr val="tx1"/>
+                      </a:solidFill>
+                      <a:prstDash val="solid"/>
+                      <a:round/>
+                      <a:headEnd type="none" w="med" len="med"/>
+                      <a:tailEnd type="none" w="med" len="med"/>
+                    </a:lnT>
+                    <a:lnB w="12700" cap="flat" cmpd="sng" algn="ctr">
+                      <a:solidFill>
+                        <a:schemeClr val="tx1"/>
+                      </a:solidFill>
+                      <a:prstDash val="solid"/>
+                      <a:round/>
+                      <a:headEnd type="none" w="med" len="med"/>
+                      <a:tailEnd type="none" w="med" len="med"/>
+                    </a:lnB>
+                    <a:noFill/>
+                  </a:tcPr>
+                </a:tc>
+                <a:extLst>
+                  <a:ext uri="{0D108BD9-81ED-4DB2-BD59-A6C34878D82A}">
+                    <a16:rowId xmlns:a16="http://schemas.microsoft.com/office/drawing/2014/main" val="807255153"/>
+                  </a:ext>
+                </a:extLst>
+              </a:tr>
+              <a:tr h="298494">
+                <a:tc>
+                  <a:txBody>
+                    <a:bodyPr/>
+                    <a:lstStyle/>
+                    <a:p>
+                      <a:pPr algn="ctr" latinLnBrk="1"/>
+                      <a:r>
+                        <a:rPr lang="en-US" altLang="ko-KR" sz="1100" dirty="0">
+                          <a:solidFill>
+                            <a:schemeClr val="tx1"/>
+                          </a:solidFill>
+                        </a:rPr>
+                        <a:t>7</a:t>
+                      </a:r>
+                      <a:endParaRPr lang="ko-KR" altLang="en-US" sz="1100" dirty="0">
+                        <a:solidFill>
+                          <a:schemeClr val="tx1"/>
+                        </a:solidFill>
+                      </a:endParaRPr>
+                    </a:p>
+                  </a:txBody>
+                  <a:tcPr>
+                    <a:lnL w="12700" cap="flat" cmpd="sng" algn="ctr">
+                      <a:solidFill>
+                        <a:schemeClr val="tx1"/>
+                      </a:solidFill>
+                      <a:prstDash val="solid"/>
+                      <a:round/>
+                      <a:headEnd type="none" w="med" len="med"/>
+                      <a:tailEnd type="none" w="med" len="med"/>
+                    </a:lnL>
+                    <a:lnR w="12700" cap="flat" cmpd="sng" algn="ctr">
+                      <a:solidFill>
+                        <a:schemeClr val="tx1"/>
+                      </a:solidFill>
+                      <a:prstDash val="solid"/>
+                      <a:round/>
+                      <a:headEnd type="none" w="med" len="med"/>
+                      <a:tailEnd type="none" w="med" len="med"/>
+                    </a:lnR>
+                    <a:lnT w="12700" cap="flat" cmpd="sng" algn="ctr">
+                      <a:solidFill>
+                        <a:schemeClr val="tx1"/>
+                      </a:solidFill>
+                      <a:prstDash val="solid"/>
+                      <a:round/>
+                      <a:headEnd type="none" w="med" len="med"/>
+                      <a:tailEnd type="none" w="med" len="med"/>
+                    </a:lnT>
+                    <a:lnB w="12700" cap="flat" cmpd="sng" algn="ctr">
+                      <a:solidFill>
+                        <a:schemeClr val="tx1"/>
+                      </a:solidFill>
+                      <a:prstDash val="solid"/>
+                      <a:round/>
+                      <a:headEnd type="none" w="med" len="med"/>
+                      <a:tailEnd type="none" w="med" len="med"/>
+                    </a:lnB>
+                    <a:noFill/>
+                  </a:tcPr>
+                </a:tc>
+                <a:tc>
+                  <a:txBody>
+                    <a:bodyPr/>
+                    <a:lstStyle/>
+                    <a:p>
+                      <a:pPr algn="ctr" latinLnBrk="1"/>
+                      <a:endParaRPr lang="ko-KR" altLang="en-US" sz="1100" dirty="0">
+                        <a:solidFill>
+                          <a:schemeClr val="tx1"/>
+                        </a:solidFill>
+                      </a:endParaRPr>
+                    </a:p>
+                  </a:txBody>
+                  <a:tcPr>
+                    <a:lnL w="12700" cap="flat" cmpd="sng" algn="ctr">
+                      <a:solidFill>
+                        <a:schemeClr val="tx1"/>
+                      </a:solidFill>
+                      <a:prstDash val="solid"/>
+                      <a:round/>
+                      <a:headEnd type="none" w="med" len="med"/>
+                      <a:tailEnd type="none" w="med" len="med"/>
+                    </a:lnL>
+                    <a:lnR w="12700" cap="flat" cmpd="sng" algn="ctr">
+                      <a:solidFill>
+                        <a:schemeClr val="tx1"/>
+                      </a:solidFill>
+                      <a:prstDash val="solid"/>
+                      <a:round/>
+                      <a:headEnd type="none" w="med" len="med"/>
+                      <a:tailEnd type="none" w="med" len="med"/>
+                    </a:lnR>
+                    <a:lnT w="12700" cap="flat" cmpd="sng" algn="ctr">
+                      <a:solidFill>
+                        <a:schemeClr val="tx1"/>
+                      </a:solidFill>
+                      <a:prstDash val="solid"/>
+                      <a:round/>
+                      <a:headEnd type="none" w="med" len="med"/>
+                      <a:tailEnd type="none" w="med" len="med"/>
+                    </a:lnT>
+                    <a:lnB w="12700" cap="flat" cmpd="sng" algn="ctr">
+                      <a:solidFill>
+                        <a:schemeClr val="tx1"/>
+                      </a:solidFill>
+                      <a:prstDash val="solid"/>
+                      <a:round/>
+                      <a:headEnd type="none" w="med" len="med"/>
+                      <a:tailEnd type="none" w="med" len="med"/>
+                    </a:lnB>
+                    <a:noFill/>
+                  </a:tcPr>
+                </a:tc>
+                <a:tc>
+                  <a:txBody>
+                    <a:bodyPr/>
+                    <a:lstStyle/>
+                    <a:p>
+                      <a:pPr marL="182563" indent="-182563" algn="l" latinLnBrk="1">
+                        <a:lnSpc>
+                          <a:spcPct val="125000"/>
+                        </a:lnSpc>
+                        <a:buFont typeface="Arial" panose="020B0604020202020204" pitchFamily="34" charset="0"/>
+                        <a:buChar char="•"/>
+                      </a:pPr>
+                      <a:r>
+                        <a:rPr lang="en-US" altLang="ko-KR" sz="1100" dirty="0">
+                          <a:solidFill>
+                            <a:schemeClr val="tx1"/>
+                          </a:solidFill>
+                        </a:rPr>
+                        <a:t>SNS</a:t>
+                      </a:r>
+                    </a:p>
+                    <a:p>
+                      <a:pPr marL="0" indent="0" algn="l" latinLnBrk="1">
+                        <a:lnSpc>
+                          <a:spcPct val="125000"/>
+                        </a:lnSpc>
+                        <a:buFont typeface="Arial" panose="020B0604020202020204" pitchFamily="34" charset="0"/>
+                        <a:buNone/>
+                      </a:pPr>
+                      <a:r>
+                        <a:rPr lang="en-US" altLang="ko-KR" sz="1100" dirty="0">
+                          <a:solidFill>
+                            <a:schemeClr val="tx1"/>
+                          </a:solidFill>
+                        </a:rPr>
+                        <a:t> - </a:t>
+                      </a:r>
+                      <a:r>
+                        <a:rPr lang="ko-KR" altLang="en-US" sz="1100" dirty="0">
+                          <a:solidFill>
+                            <a:schemeClr val="tx1"/>
+                          </a:solidFill>
+                        </a:rPr>
+                        <a:t>출판사 </a:t>
+                      </a:r>
+                      <a:r>
+                        <a:rPr lang="en-US" altLang="ko-KR" sz="1100" dirty="0">
+                          <a:solidFill>
+                            <a:schemeClr val="tx1"/>
+                          </a:solidFill>
+                        </a:rPr>
+                        <a:t>SNS</a:t>
+                      </a:r>
+                      <a:r>
+                        <a:rPr lang="ko-KR" altLang="en-US" sz="1100" dirty="0">
+                          <a:solidFill>
+                            <a:schemeClr val="tx1"/>
+                          </a:solidFill>
+                        </a:rPr>
+                        <a:t> 페이지로 이동</a:t>
+                      </a:r>
+                      <a:r>
+                        <a:rPr lang="en-US" altLang="ko-KR" sz="1100" dirty="0">
+                          <a:solidFill>
+                            <a:schemeClr val="tx1"/>
+                          </a:solidFill>
+                        </a:rPr>
+                        <a:t>.</a:t>
+                      </a:r>
+                    </a:p>
+                  </a:txBody>
+                  <a:tcPr>
+                    <a:lnL w="12700" cap="flat" cmpd="sng" algn="ctr">
+                      <a:solidFill>
+                        <a:schemeClr val="tx1"/>
+                      </a:solidFill>
+                      <a:prstDash val="solid"/>
+                      <a:round/>
+                      <a:headEnd type="none" w="med" len="med"/>
+                      <a:tailEnd type="none" w="med" len="med"/>
+                    </a:lnL>
+                    <a:lnR w="12700" cap="flat" cmpd="sng" algn="ctr">
+                      <a:solidFill>
+                        <a:schemeClr val="tx1"/>
+                      </a:solidFill>
+                      <a:prstDash val="solid"/>
+                      <a:round/>
+                      <a:headEnd type="none" w="med" len="med"/>
+                      <a:tailEnd type="none" w="med" len="med"/>
+                    </a:lnR>
+                    <a:lnT w="12700" cap="flat" cmpd="sng" algn="ctr">
+                      <a:solidFill>
+                        <a:schemeClr val="tx1"/>
+                      </a:solidFill>
+                      <a:prstDash val="solid"/>
+                      <a:round/>
+                      <a:headEnd type="none" w="med" len="med"/>
+                      <a:tailEnd type="none" w="med" len="med"/>
+                    </a:lnT>
+                    <a:lnB w="12700" cap="flat" cmpd="sng" algn="ctr">
+                      <a:solidFill>
+                        <a:schemeClr val="tx1"/>
+                      </a:solidFill>
+                      <a:prstDash val="solid"/>
+                      <a:round/>
+                      <a:headEnd type="none" w="med" len="med"/>
+                      <a:tailEnd type="none" w="med" len="med"/>
+                    </a:lnB>
+                    <a:noFill/>
+                  </a:tcPr>
+                </a:tc>
+                <a:extLst>
+                  <a:ext uri="{0D108BD9-81ED-4DB2-BD59-A6C34878D82A}">
+                    <a16:rowId xmlns:a16="http://schemas.microsoft.com/office/drawing/2014/main" val="2071249821"/>
                   </a:ext>
                 </a:extLst>
               </a:tr>
@@ -37501,8 +38209,8 @@
         </p:nvSpPr>
         <p:spPr>
           <a:xfrm>
-            <a:off x="156672" y="879978"/>
-            <a:ext cx="6914688" cy="1985141"/>
+            <a:off x="278598" y="1437151"/>
+            <a:ext cx="496467" cy="548018"/>
           </a:xfrm>
           <a:prstGeom prst="rect">
             <a:avLst/>
@@ -37553,8 +38261,8 @@
         </p:nvSpPr>
         <p:spPr>
           <a:xfrm>
-            <a:off x="156672" y="2953004"/>
-            <a:ext cx="3474802" cy="1749626"/>
+            <a:off x="3376496" y="3228232"/>
+            <a:ext cx="254977" cy="200768"/>
           </a:xfrm>
           <a:prstGeom prst="rect">
             <a:avLst/>
@@ -37709,7 +38417,7 @@
         </p:nvSpPr>
         <p:spPr>
           <a:xfrm>
-            <a:off x="174169" y="904021"/>
+            <a:off x="399342" y="1147338"/>
             <a:ext cx="254977" cy="254977"/>
           </a:xfrm>
           <a:prstGeom prst="ellipse">
@@ -37750,10 +38458,10 @@
       </p:sp>
       <p:sp>
         <p:nvSpPr>
-          <p:cNvPr id="33" name="타원 32">
+          <p:cNvPr id="34" name="타원 33">
             <a:extLst>
               <a:ext uri="{FF2B5EF4-FFF2-40B4-BE49-F238E27FC236}">
-                <a16:creationId xmlns:a16="http://schemas.microsoft.com/office/drawing/2014/main" id="{4E6D34F9-B099-4621-BB9A-127973199619}"/>
+                <a16:creationId xmlns:a16="http://schemas.microsoft.com/office/drawing/2014/main" id="{7D408BF1-A613-4FF9-B958-57DC5BB80A6C}"/>
               </a:ext>
             </a:extLst>
           </p:cNvPr>
@@ -37762,7 +38470,165 @@
         </p:nvSpPr>
         <p:spPr>
           <a:xfrm>
-            <a:off x="182877" y="2981014"/>
+            <a:off x="5856138" y="3022478"/>
+            <a:ext cx="254977" cy="254977"/>
+          </a:xfrm>
+          <a:prstGeom prst="ellipse">
+            <a:avLst/>
+          </a:prstGeom>
+          <a:ln>
+            <a:noFill/>
+          </a:ln>
+        </p:spPr>
+        <p:style>
+          <a:lnRef idx="2">
+            <a:schemeClr val="accent4">
+              <a:shade val="50000"/>
+            </a:schemeClr>
+          </a:lnRef>
+          <a:fillRef idx="1">
+            <a:schemeClr val="accent4"/>
+          </a:fillRef>
+          <a:effectRef idx="0">
+            <a:schemeClr val="accent4"/>
+          </a:effectRef>
+          <a:fontRef idx="minor">
+            <a:schemeClr val="lt1"/>
+          </a:fontRef>
+        </p:style>
+        <p:txBody>
+          <a:bodyPr rtlCol="0" anchor="ctr"/>
+          <a:lstStyle/>
+          <a:p>
+            <a:pPr algn="ctr"/>
+            <a:r>
+              <a:rPr lang="en-US" altLang="ko-KR" dirty="0"/>
+              <a:t>6</a:t>
+            </a:r>
+            <a:endParaRPr lang="ko-KR" altLang="en-US" dirty="0"/>
+          </a:p>
+        </p:txBody>
+      </p:sp>
+      <p:sp>
+        <p:nvSpPr>
+          <p:cNvPr id="35" name="타원 34">
+            <a:extLst>
+              <a:ext uri="{FF2B5EF4-FFF2-40B4-BE49-F238E27FC236}">
+                <a16:creationId xmlns:a16="http://schemas.microsoft.com/office/drawing/2014/main" id="{305940ED-54E8-4AFC-8132-A36AF0A11129}"/>
+              </a:ext>
+            </a:extLst>
+          </p:cNvPr>
+          <p:cNvSpPr/>
+          <p:nvPr/>
+        </p:nvSpPr>
+        <p:spPr>
+          <a:xfrm>
+            <a:off x="6354825" y="3022230"/>
+            <a:ext cx="254977" cy="254977"/>
+          </a:xfrm>
+          <a:prstGeom prst="ellipse">
+            <a:avLst/>
+          </a:prstGeom>
+          <a:ln>
+            <a:noFill/>
+          </a:ln>
+        </p:spPr>
+        <p:style>
+          <a:lnRef idx="2">
+            <a:schemeClr val="accent4">
+              <a:shade val="50000"/>
+            </a:schemeClr>
+          </a:lnRef>
+          <a:fillRef idx="1">
+            <a:schemeClr val="accent4"/>
+          </a:fillRef>
+          <a:effectRef idx="0">
+            <a:schemeClr val="accent4"/>
+          </a:effectRef>
+          <a:fontRef idx="minor">
+            <a:schemeClr val="lt1"/>
+          </a:fontRef>
+        </p:style>
+        <p:txBody>
+          <a:bodyPr rtlCol="0" anchor="ctr"/>
+          <a:lstStyle/>
+          <a:p>
+            <a:pPr algn="ctr"/>
+            <a:r>
+              <a:rPr lang="en-US" altLang="ko-KR" dirty="0"/>
+              <a:t>7</a:t>
+            </a:r>
+            <a:endParaRPr lang="ko-KR" altLang="en-US" dirty="0"/>
+          </a:p>
+        </p:txBody>
+      </p:sp>
+      <p:sp>
+        <p:nvSpPr>
+          <p:cNvPr id="13" name="직사각형 12">
+            <a:extLst>
+              <a:ext uri="{FF2B5EF4-FFF2-40B4-BE49-F238E27FC236}">
+                <a16:creationId xmlns:a16="http://schemas.microsoft.com/office/drawing/2014/main" id="{D614A4C3-5C84-4950-8ECC-36EE3CB731A7}"/>
+              </a:ext>
+            </a:extLst>
+          </p:cNvPr>
+          <p:cNvSpPr/>
+          <p:nvPr/>
+        </p:nvSpPr>
+        <p:spPr>
+          <a:xfrm>
+            <a:off x="6422533" y="1437151"/>
+            <a:ext cx="496467" cy="548018"/>
+          </a:xfrm>
+          <a:prstGeom prst="rect">
+            <a:avLst/>
+          </a:prstGeom>
+          <a:noFill/>
+          <a:ln w="28575">
+            <a:solidFill>
+              <a:srgbClr val="FF0000"/>
+            </a:solidFill>
+          </a:ln>
+        </p:spPr>
+        <p:style>
+          <a:lnRef idx="2">
+            <a:schemeClr val="accent1">
+              <a:shade val="50000"/>
+            </a:schemeClr>
+          </a:lnRef>
+          <a:fillRef idx="1">
+            <a:schemeClr val="accent1"/>
+          </a:fillRef>
+          <a:effectRef idx="0">
+            <a:schemeClr val="accent1"/>
+          </a:effectRef>
+          <a:fontRef idx="minor">
+            <a:schemeClr val="lt1"/>
+          </a:fontRef>
+        </p:style>
+        <p:txBody>
+          <a:bodyPr rtlCol="0" anchor="ctr"/>
+          <a:lstStyle/>
+          <a:p>
+            <a:pPr algn="ctr"/>
+            <a:endParaRPr lang="ko-KR" altLang="en-US"/>
+          </a:p>
+        </p:txBody>
+      </p:sp>
+      <p:sp>
+        <p:nvSpPr>
+          <p:cNvPr id="14" name="타원 13">
+            <a:extLst>
+              <a:ext uri="{FF2B5EF4-FFF2-40B4-BE49-F238E27FC236}">
+                <a16:creationId xmlns:a16="http://schemas.microsoft.com/office/drawing/2014/main" id="{2B2FA218-C8DC-40AC-AB1A-4399A3F7873B}"/>
+              </a:ext>
+            </a:extLst>
+          </p:cNvPr>
+          <p:cNvSpPr/>
+          <p:nvPr/>
+        </p:nvSpPr>
+        <p:spPr>
+          <a:xfrm>
+            <a:off x="6543277" y="1147338"/>
             <a:ext cx="254977" cy="254977"/>
           </a:xfrm>
           <a:prstGeom prst="ellipse">
@@ -37803,10 +38669,10 @@
       </p:sp>
       <p:sp>
         <p:nvSpPr>
-          <p:cNvPr id="34" name="타원 33">
+          <p:cNvPr id="15" name="직사각형 14">
             <a:extLst>
               <a:ext uri="{FF2B5EF4-FFF2-40B4-BE49-F238E27FC236}">
-                <a16:creationId xmlns:a16="http://schemas.microsoft.com/office/drawing/2014/main" id="{7D408BF1-A613-4FF9-B958-57DC5BB80A6C}"/>
+                <a16:creationId xmlns:a16="http://schemas.microsoft.com/office/drawing/2014/main" id="{E985B912-8F58-472E-83E5-A35D5A578F1B}"/>
               </a:ext>
             </a:extLst>
           </p:cNvPr>
@@ -37815,7 +38681,59 @@
         </p:nvSpPr>
         <p:spPr>
           <a:xfrm>
-            <a:off x="3882765" y="2973255"/>
+            <a:off x="888235" y="897841"/>
+            <a:ext cx="5425479" cy="1925331"/>
+          </a:xfrm>
+          <a:prstGeom prst="rect">
+            <a:avLst/>
+          </a:prstGeom>
+          <a:noFill/>
+          <a:ln w="28575">
+            <a:solidFill>
+              <a:srgbClr val="FF0000"/>
+            </a:solidFill>
+          </a:ln>
+        </p:spPr>
+        <p:style>
+          <a:lnRef idx="2">
+            <a:schemeClr val="accent1">
+              <a:shade val="50000"/>
+            </a:schemeClr>
+          </a:lnRef>
+          <a:fillRef idx="1">
+            <a:schemeClr val="accent1"/>
+          </a:fillRef>
+          <a:effectRef idx="0">
+            <a:schemeClr val="accent1"/>
+          </a:effectRef>
+          <a:fontRef idx="minor">
+            <a:schemeClr val="lt1"/>
+          </a:fontRef>
+        </p:style>
+        <p:txBody>
+          <a:bodyPr rtlCol="0" anchor="ctr"/>
+          <a:lstStyle/>
+          <a:p>
+            <a:pPr algn="ctr"/>
+            <a:endParaRPr lang="ko-KR" altLang="en-US"/>
+          </a:p>
+        </p:txBody>
+      </p:sp>
+      <p:sp>
+        <p:nvSpPr>
+          <p:cNvPr id="16" name="타원 15">
+            <a:extLst>
+              <a:ext uri="{FF2B5EF4-FFF2-40B4-BE49-F238E27FC236}">
+                <a16:creationId xmlns:a16="http://schemas.microsoft.com/office/drawing/2014/main" id="{3E0A3DC3-8506-41A9-BA40-59AC0719A972}"/>
+              </a:ext>
+            </a:extLst>
+          </p:cNvPr>
+          <p:cNvSpPr/>
+          <p:nvPr/>
+        </p:nvSpPr>
+        <p:spPr>
+          <a:xfrm>
+            <a:off x="3470323" y="951107"/>
             <a:ext cx="254977" cy="254977"/>
           </a:xfrm>
           <a:prstGeom prst="ellipse">
@@ -37856,10 +38774,10 @@
       </p:sp>
       <p:sp>
         <p:nvSpPr>
-          <p:cNvPr id="35" name="타원 34">
+          <p:cNvPr id="17" name="직사각형 16">
             <a:extLst>
               <a:ext uri="{FF2B5EF4-FFF2-40B4-BE49-F238E27FC236}">
-                <a16:creationId xmlns:a16="http://schemas.microsoft.com/office/drawing/2014/main" id="{305940ED-54E8-4AFC-8132-A36AF0A11129}"/>
+                <a16:creationId xmlns:a16="http://schemas.microsoft.com/office/drawing/2014/main" id="{040D83C5-8EA9-4653-A51F-F68AA32882F3}"/>
               </a:ext>
             </a:extLst>
           </p:cNvPr>
@@ -37868,7 +38786,112 @@
         </p:nvSpPr>
         <p:spPr>
           <a:xfrm>
-            <a:off x="6247186" y="2978933"/>
+            <a:off x="278598" y="3429000"/>
+            <a:ext cx="3000550" cy="1271081"/>
+          </a:xfrm>
+          <a:prstGeom prst="rect">
+            <a:avLst/>
+          </a:prstGeom>
+          <a:noFill/>
+          <a:ln w="28575">
+            <a:solidFill>
+              <a:srgbClr val="FF0000"/>
+            </a:solidFill>
+          </a:ln>
+        </p:spPr>
+        <p:style>
+          <a:lnRef idx="2">
+            <a:schemeClr val="accent1">
+              <a:shade val="50000"/>
+            </a:schemeClr>
+          </a:lnRef>
+          <a:fillRef idx="1">
+            <a:schemeClr val="accent1"/>
+          </a:fillRef>
+          <a:effectRef idx="0">
+            <a:schemeClr val="accent1"/>
+          </a:effectRef>
+          <a:fontRef idx="minor">
+            <a:schemeClr val="lt1"/>
+          </a:fontRef>
+        </p:style>
+        <p:txBody>
+          <a:bodyPr rtlCol="0" anchor="ctr"/>
+          <a:lstStyle/>
+          <a:p>
+            <a:pPr algn="ctr"/>
+            <a:endParaRPr lang="ko-KR" altLang="en-US"/>
+          </a:p>
+        </p:txBody>
+      </p:sp>
+      <p:sp>
+        <p:nvSpPr>
+          <p:cNvPr id="18" name="타원 17">
+            <a:extLst>
+              <a:ext uri="{FF2B5EF4-FFF2-40B4-BE49-F238E27FC236}">
+                <a16:creationId xmlns:a16="http://schemas.microsoft.com/office/drawing/2014/main" id="{2F448F66-1E7A-491D-8F09-84283FD9FC35}"/>
+              </a:ext>
+            </a:extLst>
+          </p:cNvPr>
+          <p:cNvSpPr/>
+          <p:nvPr/>
+        </p:nvSpPr>
+        <p:spPr>
+          <a:xfrm>
+            <a:off x="3382780" y="2920262"/>
+            <a:ext cx="254977" cy="254977"/>
+          </a:xfrm>
+          <a:prstGeom prst="ellipse">
+            <a:avLst/>
+          </a:prstGeom>
+          <a:ln>
+            <a:noFill/>
+          </a:ln>
+        </p:spPr>
+        <p:style>
+          <a:lnRef idx="2">
+            <a:schemeClr val="accent4">
+              <a:shade val="50000"/>
+            </a:schemeClr>
+          </a:lnRef>
+          <a:fillRef idx="1">
+            <a:schemeClr val="accent4"/>
+          </a:fillRef>
+          <a:effectRef idx="0">
+            <a:schemeClr val="accent4"/>
+          </a:effectRef>
+          <a:fontRef idx="minor">
+            <a:schemeClr val="lt1"/>
+          </a:fontRef>
+        </p:style>
+        <p:txBody>
+          <a:bodyPr rtlCol="0" anchor="ctr"/>
+          <a:lstStyle/>
+          <a:p>
+            <a:pPr algn="ctr"/>
+            <a:r>
+              <a:rPr lang="en-US" altLang="ko-KR" dirty="0"/>
+              <a:t>5</a:t>
+            </a:r>
+            <a:endParaRPr lang="ko-KR" altLang="en-US" dirty="0"/>
+          </a:p>
+        </p:txBody>
+      </p:sp>
+      <p:sp>
+        <p:nvSpPr>
+          <p:cNvPr id="19" name="타원 18">
+            <a:extLst>
+              <a:ext uri="{FF2B5EF4-FFF2-40B4-BE49-F238E27FC236}">
+                <a16:creationId xmlns:a16="http://schemas.microsoft.com/office/drawing/2014/main" id="{13DDD398-7678-4FF8-B882-CB6F54354732}"/>
+              </a:ext>
+            </a:extLst>
+          </p:cNvPr>
+          <p:cNvSpPr/>
+          <p:nvPr/>
+        </p:nvSpPr>
+        <p:spPr>
+          <a:xfrm>
+            <a:off x="2968847" y="3113060"/>
             <a:ext cx="254977" cy="254977"/>
           </a:xfrm>
           <a:prstGeom prst="ellipse">
@@ -37986,7 +39009,7 @@
           <p:nvPr>
             <p:extLst>
               <p:ext uri="{D42A27DB-BD31-4B8C-83A1-F6EECF244321}">
-                <p14:modId xmlns:p14="http://schemas.microsoft.com/office/powerpoint/2010/main" val="2176362593"/>
+                <p14:modId xmlns:p14="http://schemas.microsoft.com/office/powerpoint/2010/main" val="4146134572"/>
               </p:ext>
             </p:extLst>
           </p:nvPr>
@@ -38304,7 +39327,7 @@
                             <a:schemeClr val="tx1"/>
                           </a:solidFill>
                         </a:rPr>
-                        <a:t>F-13</a:t>
+                        <a:t>PS-front-sign</a:t>
                       </a:r>
                       <a:endParaRPr lang="ko-KR" altLang="en-US" sz="1600" dirty="0">
                         <a:solidFill>
@@ -38420,22 +39443,6 @@
                     <a:lstStyle/>
                     <a:p>
                       <a:pPr algn="ctr" latinLnBrk="1"/>
-                      <a:r>
-                        <a:rPr lang="en-US" altLang="ko-KR" sz="1600" dirty="0" err="1">
-                          <a:solidFill>
-                            <a:schemeClr val="tx1"/>
-                          </a:solidFill>
-                        </a:rPr>
-                        <a:t>Gnb</a:t>
-                      </a:r>
-                      <a:r>
-                        <a:rPr lang="en-US" altLang="ko-KR" sz="1600" dirty="0">
-                          <a:solidFill>
-                            <a:schemeClr val="tx1"/>
-                          </a:solidFill>
-                        </a:rPr>
-                        <a:t> &gt; </a:t>
-                      </a:r>
                       <a:r>
                         <a:rPr lang="ko-KR" altLang="en-US" sz="1600" dirty="0">
                           <a:solidFill>
@@ -38561,14 +39568,14 @@
           <p:nvPr>
             <p:extLst>
               <p:ext uri="{D42A27DB-BD31-4B8C-83A1-F6EECF244321}">
-                <p14:modId xmlns:p14="http://schemas.microsoft.com/office/powerpoint/2010/main" val="1875890203"/>
+                <p14:modId xmlns:p14="http://schemas.microsoft.com/office/powerpoint/2010/main" val="4198334046"/>
               </p:ext>
             </p:extLst>
           </p:nvPr>
         </p:nvGraphicFramePr>
         <p:xfrm>
-          <a:off x="7292972" y="793154"/>
-          <a:ext cx="4899028" cy="3555685"/>
+          <a:off x="7292972" y="793156"/>
+          <a:ext cx="4899028" cy="3306131"/>
         </p:xfrm>
         <a:graphic>
           <a:graphicData uri="http://schemas.openxmlformats.org/drawingml/2006/table">
@@ -38599,7 +39606,7 @@
                   </a:extLst>
                 </a:gridCol>
               </a:tblGrid>
-              <a:tr h="370840">
+              <a:tr h="278263">
                 <a:tc>
                   <a:txBody>
                     <a:bodyPr/>
@@ -38804,7 +39811,7 @@
                   </a:ext>
                 </a:extLst>
               </a:tr>
-              <a:tr h="370840">
+              <a:tr h="278263">
                 <a:tc>
                   <a:txBody>
                     <a:bodyPr/>
@@ -39043,7 +40050,7 @@
                   </a:ext>
                 </a:extLst>
               </a:tr>
-              <a:tr h="370840">
+              <a:tr h="278263">
                 <a:tc>
                   <a:txBody>
                     <a:bodyPr/>
@@ -39282,7 +40289,7 @@
                   </a:ext>
                 </a:extLst>
               </a:tr>
-              <a:tr h="370840">
+              <a:tr h="351789">
                 <a:tc>
                   <a:txBody>
                     <a:bodyPr/>
@@ -39445,7 +40452,7 @@
                             <a:schemeClr val="tx1"/>
                           </a:solidFill>
                         </a:rPr>
-                        <a:t>클릭 시 다음 로그인 할 때 아이디 자동 입력</a:t>
+                        <a:t>아이디 저장 기능 체크박스</a:t>
                       </a:r>
                       <a:r>
                         <a:rPr lang="en-US" altLang="ko-KR" sz="1100" baseline="0" dirty="0">
@@ -39453,7 +40460,7 @@
                             <a:schemeClr val="tx1"/>
                           </a:solidFill>
                         </a:rPr>
-                        <a:t>. </a:t>
+                        <a:t>.</a:t>
                       </a:r>
                     </a:p>
                   </a:txBody>
@@ -39503,7 +40510,7 @@
                   </a:ext>
                 </a:extLst>
               </a:tr>
-              <a:tr h="370840">
+              <a:tr h="305768">
                 <a:tc>
                   <a:txBody>
                     <a:bodyPr/>
@@ -39658,33 +40665,25 @@
                             <a:schemeClr val="tx1"/>
                           </a:solidFill>
                         </a:rPr>
-                        <a:t> -</a:t>
-                      </a:r>
-                      <a:r>
-                        <a:rPr lang="en-US" altLang="ko-KR" sz="1100" baseline="0" dirty="0">
-                          <a:solidFill>
-                            <a:schemeClr val="tx1"/>
-                          </a:solidFill>
-                        </a:rPr>
-                        <a:t> </a:t>
-                      </a:r>
-                      <a:r>
-                        <a:rPr lang="ko-KR" altLang="en-US" sz="1100" baseline="0" dirty="0">
-                          <a:solidFill>
-                            <a:schemeClr val="tx1"/>
-                          </a:solidFill>
-                        </a:rPr>
-                        <a:t>로그인 성공 시 메인 페이지로 이동</a:t>
-                      </a:r>
-                      <a:r>
-                        <a:rPr lang="en-US" altLang="ko-KR" sz="1100" baseline="0" dirty="0">
+                        <a:t> - </a:t>
+                      </a:r>
+                      <a:r>
+                        <a:rPr lang="ko-KR" altLang="en-US" sz="1100" dirty="0">
+                          <a:solidFill>
+                            <a:schemeClr val="tx1"/>
+                          </a:solidFill>
+                        </a:rPr>
+                        <a:t>로그인 기능 버튼</a:t>
+                      </a:r>
+                      <a:r>
+                        <a:rPr lang="en-US" altLang="ko-KR" sz="1100" dirty="0">
                           <a:solidFill>
                             <a:schemeClr val="tx1"/>
                           </a:solidFill>
                         </a:rPr>
                         <a:t>.</a:t>
                       </a:r>
-                      <a:endParaRPr lang="en-US" altLang="ko-KR" sz="1100" dirty="0">
+                      <a:endParaRPr lang="en-US" altLang="ko-KR" sz="1000" dirty="0">
                         <a:solidFill>
                           <a:schemeClr val="tx1"/>
                         </a:solidFill>
@@ -39737,7 +40736,7 @@
                   </a:ext>
                 </a:extLst>
               </a:tr>
-              <a:tr h="370840">
+              <a:tr h="0">
                 <a:tc>
                   <a:txBody>
                     <a:bodyPr/>
@@ -39958,7 +40957,7 @@
                   </a:ext>
                 </a:extLst>
               </a:tr>
-              <a:tr h="370840">
+              <a:tr h="437236">
                 <a:tc>
                   <a:txBody>
                     <a:bodyPr/>
@@ -40179,7 +41178,7 @@
                   </a:ext>
                 </a:extLst>
               </a:tr>
-              <a:tr h="370840">
+              <a:tr h="437236">
                 <a:tc>
                   <a:txBody>
                     <a:bodyPr/>
@@ -40342,7 +41341,7 @@
                             <a:schemeClr val="tx1"/>
                           </a:solidFill>
                         </a:rPr>
-                        <a:t>약관 동의 페이지로 이동</a:t>
+                        <a:t>회원가입 페이지로 이동</a:t>
                       </a:r>
                       <a:r>
                         <a:rPr lang="en-US" altLang="ko-KR" sz="1100" dirty="0">
@@ -41218,7 +42217,7 @@
           <p:nvPr>
             <p:extLst>
               <p:ext uri="{D42A27DB-BD31-4B8C-83A1-F6EECF244321}">
-                <p14:modId xmlns:p14="http://schemas.microsoft.com/office/powerpoint/2010/main" val="2004870930"/>
+                <p14:modId xmlns:p14="http://schemas.microsoft.com/office/powerpoint/2010/main" val="2472189254"/>
               </p:ext>
             </p:extLst>
           </p:nvPr>
@@ -41536,7 +42535,15 @@
                             <a:schemeClr val="tx1"/>
                           </a:solidFill>
                         </a:rPr>
-                        <a:t>F-14</a:t>
+                        <a:t>PS-front-</a:t>
+                      </a:r>
+                      <a:r>
+                        <a:rPr lang="en-US" altLang="ko-KR" sz="1600" dirty="0" err="1">
+                          <a:solidFill>
+                            <a:schemeClr val="tx1"/>
+                          </a:solidFill>
+                        </a:rPr>
+                        <a:t>id_find</a:t>
                       </a:r>
                       <a:endParaRPr lang="ko-KR" altLang="en-US" sz="1600" dirty="0">
                         <a:solidFill>
@@ -41652,22 +42659,6 @@
                     <a:lstStyle/>
                     <a:p>
                       <a:pPr algn="ctr" latinLnBrk="1"/>
-                      <a:r>
-                        <a:rPr lang="en-US" altLang="ko-KR" sz="1600" dirty="0" err="1">
-                          <a:solidFill>
-                            <a:schemeClr val="tx1"/>
-                          </a:solidFill>
-                        </a:rPr>
-                        <a:t>Gnb</a:t>
-                      </a:r>
-                      <a:r>
-                        <a:rPr lang="en-US" altLang="ko-KR" sz="1600" dirty="0">
-                          <a:solidFill>
-                            <a:schemeClr val="tx1"/>
-                          </a:solidFill>
-                        </a:rPr>
-                        <a:t> &gt; </a:t>
-                      </a:r>
                       <a:r>
                         <a:rPr lang="ko-KR" altLang="en-US" sz="1600" dirty="0">
                           <a:solidFill>
@@ -41809,7 +42800,7 @@
           <p:nvPr>
             <p:extLst>
               <p:ext uri="{D42A27DB-BD31-4B8C-83A1-F6EECF244321}">
-                <p14:modId xmlns:p14="http://schemas.microsoft.com/office/powerpoint/2010/main" val="2045963023"/>
+                <p14:modId xmlns:p14="http://schemas.microsoft.com/office/powerpoint/2010/main" val="667782237"/>
               </p:ext>
             </p:extLst>
           </p:nvPr>
@@ -42632,12 +43623,20 @@
                         <a:buNone/>
                       </a:pPr>
                       <a:r>
+                        <a:rPr lang="ko-KR" altLang="en-US" sz="1100" baseline="0" dirty="0">
+                          <a:solidFill>
+                            <a:schemeClr val="tx1"/>
+                          </a:solidFill>
+                        </a:rPr>
+                        <a:t> </a:t>
+                      </a:r>
+                      <a:r>
                         <a:rPr lang="en-US" altLang="ko-KR" sz="1100" baseline="0" dirty="0">
                           <a:solidFill>
                             <a:schemeClr val="tx1"/>
                           </a:solidFill>
                         </a:rPr>
-                        <a:t> - 6</a:t>
+                        <a:t>- </a:t>
                       </a:r>
                       <a:r>
                         <a:rPr lang="ko-KR" altLang="en-US" sz="1100" baseline="0" dirty="0">
@@ -42645,7 +43644,7 @@
                             <a:schemeClr val="tx1"/>
                           </a:solidFill>
                         </a:rPr>
-                        <a:t>자리 인증번호 출력</a:t>
+                        <a:t>인증 요청 기능 버튼</a:t>
                       </a:r>
                       <a:r>
                         <a:rPr lang="en-US" altLang="ko-KR" sz="1100" baseline="0" dirty="0">
@@ -42655,6 +43654,11 @@
                         </a:rPr>
                         <a:t>.</a:t>
                       </a:r>
+                      <a:endParaRPr lang="en-US" altLang="ko-KR" sz="1000" baseline="0" dirty="0">
+                        <a:solidFill>
+                          <a:schemeClr val="tx1"/>
+                        </a:solidFill>
+                      </a:endParaRPr>
                     </a:p>
                   </a:txBody>
                   <a:tcPr>
@@ -42874,7 +43878,7 @@
                             <a:schemeClr val="tx1"/>
                           </a:solidFill>
                         </a:rPr>
-                        <a:t>인증 성공 시 팝업창으로 아이디 출력</a:t>
+                        <a:t>아이디 요청 기능 버튼</a:t>
                       </a:r>
                       <a:r>
                         <a:rPr lang="en-US" altLang="ko-KR" sz="1100" baseline="0" dirty="0">
@@ -44220,4 +45224,299 @@
     </a:ext>
   </a:extLst>
 </a:theme>
+</file>
+
+<file path=ppt/theme/theme3.xml><?xml version="1.0" encoding="utf-8"?>
+<a:theme xmlns:a="http://schemas.openxmlformats.org/drawingml/2006/main" name="Office 테마">
+  <a:themeElements>
+    <a:clrScheme name="Office">
+      <a:dk1>
+        <a:sysClr val="windowText" lastClr="000000"/>
+      </a:dk1>
+      <a:lt1>
+        <a:sysClr val="window" lastClr="FFFFFF"/>
+      </a:lt1>
+      <a:dk2>
+        <a:srgbClr val="44546A"/>
+      </a:dk2>
+      <a:lt2>
+        <a:srgbClr val="E7E6E6"/>
+      </a:lt2>
+      <a:accent1>
+        <a:srgbClr val="4472C4"/>
+      </a:accent1>
+      <a:accent2>
+        <a:srgbClr val="ED7D31"/>
+      </a:accent2>
+      <a:accent3>
+        <a:srgbClr val="A5A5A5"/>
+      </a:accent3>
+      <a:accent4>
+        <a:srgbClr val="FFC000"/>
+      </a:accent4>
+      <a:accent5>
+        <a:srgbClr val="5B9BD5"/>
+      </a:accent5>
+      <a:accent6>
+        <a:srgbClr val="70AD47"/>
+      </a:accent6>
+      <a:hlink>
+        <a:srgbClr val="0563C1"/>
+      </a:hlink>
+      <a:folHlink>
+        <a:srgbClr val="954F72"/>
+      </a:folHlink>
+    </a:clrScheme>
+    <a:fontScheme name="Office">
+      <a:majorFont>
+        <a:latin typeface="맑은 고딕" panose="020F0302020204030204"/>
+        <a:ea typeface=""/>
+        <a:cs typeface=""/>
+        <a:font script="Jpan" typeface="游ゴシック Light"/>
+        <a:font script="Hang" typeface="맑은 고딕"/>
+        <a:font script="Hans" typeface="等线 Light"/>
+        <a:font script="Hant" typeface="新細明體"/>
+        <a:font script="Arab" typeface="Times New Roman"/>
+        <a:font script="Hebr" typeface="Times New Roman"/>
+        <a:font script="Thai" typeface="Angsana New"/>
+        <a:font script="Ethi" typeface="Nyala"/>
+        <a:font script="Beng" typeface="Vrinda"/>
+        <a:font script="Gujr" typeface="Shruti"/>
+        <a:font script="Khmr" typeface="MoolBoran"/>
+        <a:font script="Knda" typeface="Tunga"/>
+        <a:font script="Guru" typeface="Raavi"/>
+        <a:font script="Cans" typeface="Euphemia"/>
+        <a:font script="Cher" typeface="Plantagenet Cherokee"/>
+        <a:font script="Yiii" typeface="Microsoft Yi Baiti"/>
+        <a:font script="Tibt" typeface="Microsoft Himalaya"/>
+        <a:font script="Thaa" typeface="MV Boli"/>
+        <a:font script="Deva" typeface="Mangal"/>
+        <a:font script="Telu" typeface="Gautami"/>
+        <a:font script="Taml" typeface="Latha"/>
+        <a:font script="Syrc" typeface="Estrangelo Edessa"/>
+        <a:font script="Orya" typeface="Kalinga"/>
+        <a:font script="Mlym" typeface="Kartika"/>
+        <a:font script="Laoo" typeface="DokChampa"/>
+        <a:font script="Sinh" typeface="Iskoola Pota"/>
+        <a:font script="Mong" typeface="Mongolian Baiti"/>
+        <a:font script="Viet" typeface="Times New Roman"/>
+        <a:font script="Uigh" typeface="Microsoft Uighur"/>
+        <a:font script="Geor" typeface="Sylfaen"/>
+        <a:font script="Armn" typeface="Arial"/>
+        <a:font script="Bugi" typeface="Leelawadee UI"/>
+        <a:font script="Bopo" typeface="Microsoft JhengHei"/>
+        <a:font script="Java" typeface="Javanese Text"/>
+        <a:font script="Lisu" typeface="Segoe UI"/>
+        <a:font script="Mymr" typeface="Myanmar Text"/>
+        <a:font script="Nkoo" typeface="Ebrima"/>
+        <a:font script="Olck" typeface="Nirmala UI"/>
+        <a:font script="Osma" typeface="Ebrima"/>
+        <a:font script="Phag" typeface="Phagspa"/>
+        <a:font script="Syrn" typeface="Estrangelo Edessa"/>
+        <a:font script="Syrj" typeface="Estrangelo Edessa"/>
+        <a:font script="Syre" typeface="Estrangelo Edessa"/>
+        <a:font script="Sora" typeface="Nirmala UI"/>
+        <a:font script="Tale" typeface="Microsoft Tai Le"/>
+        <a:font script="Talu" typeface="Microsoft New Tai Lue"/>
+        <a:font script="Tfng" typeface="Ebrima"/>
+      </a:majorFont>
+      <a:minorFont>
+        <a:latin typeface="맑은 고딕" panose="020F0502020204030204"/>
+        <a:ea typeface=""/>
+        <a:cs typeface=""/>
+        <a:font script="Jpan" typeface="游ゴシック"/>
+        <a:font script="Hang" typeface="맑은 고딕"/>
+        <a:font script="Hans" typeface="等线"/>
+        <a:font script="Hant" typeface="新細明體"/>
+        <a:font script="Arab" typeface="Arial"/>
+        <a:font script="Hebr" typeface="Arial"/>
+        <a:font script="Thai" typeface="Cordia New"/>
+        <a:font script="Ethi" typeface="Nyala"/>
+        <a:font script="Beng" typeface="Vrinda"/>
+        <a:font script="Gujr" typeface="Shruti"/>
+        <a:font script="Khmr" typeface="DaunPenh"/>
+        <a:font script="Knda" typeface="Tunga"/>
+        <a:font script="Guru" typeface="Raavi"/>
+        <a:font script="Cans" typeface="Euphemia"/>
+        <a:font script="Cher" typeface="Plantagenet Cherokee"/>
+        <a:font script="Yiii" typeface="Microsoft Yi Baiti"/>
+        <a:font script="Tibt" typeface="Microsoft Himalaya"/>
+        <a:font script="Thaa" typeface="MV Boli"/>
+        <a:font script="Deva" typeface="Mangal"/>
+        <a:font script="Telu" typeface="Gautami"/>
+        <a:font script="Taml" typeface="Latha"/>
+        <a:font script="Syrc" typeface="Estrangelo Edessa"/>
+        <a:font script="Orya" typeface="Kalinga"/>
+        <a:font script="Mlym" typeface="Kartika"/>
+        <a:font script="Laoo" typeface="DokChampa"/>
+        <a:font script="Sinh" typeface="Iskoola Pota"/>
+        <a:font script="Mong" typeface="Mongolian Baiti"/>
+        <a:font script="Viet" typeface="Arial"/>
+        <a:font script="Uigh" typeface="Microsoft Uighur"/>
+        <a:font script="Geor" typeface="Sylfaen"/>
+        <a:font script="Armn" typeface="Arial"/>
+        <a:font script="Bugi" typeface="Leelawadee UI"/>
+        <a:font script="Bopo" typeface="Microsoft JhengHei"/>
+        <a:font script="Java" typeface="Javanese Text"/>
+        <a:font script="Lisu" typeface="Segoe UI"/>
+        <a:font script="Mymr" typeface="Myanmar Text"/>
+        <a:font script="Nkoo" typeface="Ebrima"/>
+        <a:font script="Olck" typeface="Nirmala UI"/>
+        <a:font script="Osma" typeface="Ebrima"/>
+        <a:font script="Phag" typeface="Phagspa"/>
+        <a:font script="Syrn" typeface="Estrangelo Edessa"/>
+        <a:font script="Syrj" typeface="Estrangelo Edessa"/>
+        <a:font script="Syre" typeface="Estrangelo Edessa"/>
+        <a:font script="Sora" typeface="Nirmala UI"/>
+        <a:font script="Tale" typeface="Microsoft Tai Le"/>
+        <a:font script="Talu" typeface="Microsoft New Tai Lue"/>
+        <a:font script="Tfng" typeface="Ebrima"/>
+      </a:minorFont>
+    </a:fontScheme>
+    <a:fmtScheme name="Office">
+      <a:fillStyleLst>
+        <a:solidFill>
+          <a:schemeClr val="phClr"/>
+        </a:solidFill>
+        <a:gradFill rotWithShape="1">
+          <a:gsLst>
+            <a:gs pos="0">
+              <a:schemeClr val="phClr">
+                <a:lumMod val="110000"/>
+                <a:satMod val="105000"/>
+                <a:tint val="67000"/>
+              </a:schemeClr>
+            </a:gs>
+            <a:gs pos="50000">
+              <a:schemeClr val="phClr">
+                <a:lumMod val="105000"/>
+                <a:satMod val="103000"/>
+                <a:tint val="73000"/>
+              </a:schemeClr>
+            </a:gs>
+            <a:gs pos="100000">
+              <a:schemeClr val="phClr">
+                <a:lumMod val="105000"/>
+                <a:satMod val="109000"/>
+                <a:tint val="81000"/>
+              </a:schemeClr>
+            </a:gs>
+          </a:gsLst>
+          <a:lin ang="5400000" scaled="0"/>
+        </a:gradFill>
+        <a:gradFill rotWithShape="1">
+          <a:gsLst>
+            <a:gs pos="0">
+              <a:schemeClr val="phClr">
+                <a:satMod val="103000"/>
+                <a:lumMod val="102000"/>
+                <a:tint val="94000"/>
+              </a:schemeClr>
+            </a:gs>
+            <a:gs pos="50000">
+              <a:schemeClr val="phClr">
+                <a:satMod val="110000"/>
+                <a:lumMod val="100000"/>
+                <a:shade val="100000"/>
+              </a:schemeClr>
+            </a:gs>
+            <a:gs pos="100000">
+              <a:schemeClr val="phClr">
+                <a:lumMod val="99000"/>
+                <a:satMod val="120000"/>
+                <a:shade val="78000"/>
+              </a:schemeClr>
+            </a:gs>
+          </a:gsLst>
+          <a:lin ang="5400000" scaled="0"/>
+        </a:gradFill>
+      </a:fillStyleLst>
+      <a:lnStyleLst>
+        <a:ln w="6350" cap="flat" cmpd="sng" algn="ctr">
+          <a:solidFill>
+            <a:schemeClr val="phClr"/>
+          </a:solidFill>
+          <a:prstDash val="solid"/>
+          <a:miter lim="800000"/>
+        </a:ln>
+        <a:ln w="12700" cap="flat" cmpd="sng" algn="ctr">
+          <a:solidFill>
+            <a:schemeClr val="phClr"/>
+          </a:solidFill>
+          <a:prstDash val="solid"/>
+          <a:miter lim="800000"/>
+        </a:ln>
+        <a:ln w="19050" cap="flat" cmpd="sng" algn="ctr">
+          <a:solidFill>
+            <a:schemeClr val="phClr"/>
+          </a:solidFill>
+          <a:prstDash val="solid"/>
+          <a:miter lim="800000"/>
+        </a:ln>
+      </a:lnStyleLst>
+      <a:effectStyleLst>
+        <a:effectStyle>
+          <a:effectLst/>
+        </a:effectStyle>
+        <a:effectStyle>
+          <a:effectLst/>
+        </a:effectStyle>
+        <a:effectStyle>
+          <a:effectLst>
+            <a:outerShdw blurRad="57150" dist="19050" dir="5400000" algn="ctr" rotWithShape="0">
+              <a:srgbClr val="000000">
+                <a:alpha val="63000"/>
+              </a:srgbClr>
+            </a:outerShdw>
+          </a:effectLst>
+        </a:effectStyle>
+      </a:effectStyleLst>
+      <a:bgFillStyleLst>
+        <a:solidFill>
+          <a:schemeClr val="phClr"/>
+        </a:solidFill>
+        <a:solidFill>
+          <a:schemeClr val="phClr">
+            <a:tint val="95000"/>
+            <a:satMod val="170000"/>
+          </a:schemeClr>
+        </a:solidFill>
+        <a:gradFill rotWithShape="1">
+          <a:gsLst>
+            <a:gs pos="0">
+              <a:schemeClr val="phClr">
+                <a:tint val="93000"/>
+                <a:satMod val="150000"/>
+                <a:shade val="98000"/>
+                <a:lumMod val="102000"/>
+              </a:schemeClr>
+            </a:gs>
+            <a:gs pos="50000">
+              <a:schemeClr val="phClr">
+                <a:tint val="98000"/>
+                <a:satMod val="130000"/>
+                <a:shade val="90000"/>
+                <a:lumMod val="103000"/>
+              </a:schemeClr>
+            </a:gs>
+            <a:gs pos="100000">
+              <a:schemeClr val="phClr">
+                <a:shade val="63000"/>
+                <a:satMod val="120000"/>
+              </a:schemeClr>
+            </a:gs>
+          </a:gsLst>
+          <a:lin ang="5400000" scaled="0"/>
+        </a:gradFill>
+      </a:bgFillStyleLst>
+    </a:fmtScheme>
+  </a:themeElements>
+  <a:objectDefaults/>
+  <a:extraClrSchemeLst/>
+  <a:extLst>
+    <a:ext uri="{05A4C25C-085E-4340-85A3-A5531E510DB2}">
+      <thm15:themeFamily xmlns:thm15="http://schemas.microsoft.com/office/thememl/2012/main" name="Office Theme" id="{62F939B6-93AF-4DB8-9C6B-D6C7DFDC589F}" vid="{4A3C46E8-61CC-4603-A589-7422A47A8E4A}"/>
+    </a:ext>
+  </a:extLst>
+</a:theme>
 </file>
</xml_diff>